<commit_message>
rescue from dead disk...
</commit_message>
<xml_diff>
--- a/doc/note_sayaka.pptx
+++ b/doc/note_sayaka.pptx
@@ -5,20 +5,29 @@
     <p:sldMasterId id="2147483648" r:id="rId1"/>
   </p:sldMasterIdLst>
   <p:notesMasterIdLst>
-    <p:notesMasterId r:id="rId10"/>
+    <p:notesMasterId r:id="rId16"/>
   </p:notesMasterIdLst>
+  <p:handoutMasterIdLst>
+    <p:handoutMasterId r:id="rId17"/>
+  </p:handoutMasterIdLst>
   <p:sldIdLst>
     <p:sldId id="256" r:id="rId2"/>
     <p:sldId id="257" r:id="rId3"/>
-    <p:sldId id="263" r:id="rId4"/>
-    <p:sldId id="260" r:id="rId5"/>
-    <p:sldId id="261" r:id="rId6"/>
-    <p:sldId id="258" r:id="rId7"/>
-    <p:sldId id="259" r:id="rId8"/>
-    <p:sldId id="262" r:id="rId9"/>
+    <p:sldId id="260" r:id="rId4"/>
+    <p:sldId id="269" r:id="rId5"/>
+    <p:sldId id="263" r:id="rId6"/>
+    <p:sldId id="268" r:id="rId7"/>
+    <p:sldId id="264" r:id="rId8"/>
+    <p:sldId id="265" r:id="rId9"/>
+    <p:sldId id="261" r:id="rId10"/>
+    <p:sldId id="258" r:id="rId11"/>
+    <p:sldId id="259" r:id="rId12"/>
+    <p:sldId id="262" r:id="rId13"/>
+    <p:sldId id="266" r:id="rId14"/>
+    <p:sldId id="267" r:id="rId15"/>
   </p:sldIdLst>
   <p:sldSz cx="12192000" cy="6858000"/>
-  <p:notesSz cx="6858000" cy="9144000"/>
+  <p:notesSz cx="9928225" cy="6797675"/>
   <p:defaultTextStyle>
     <a:defPPr>
       <a:defRPr lang="ja-JP"/>
@@ -114,7 +123,177 @@
       </a:defRPr>
     </a:lvl9pPr>
   </p:defaultTextStyle>
+  <p:extLst>
+    <p:ext uri="{EFAFB233-063F-42B5-8137-9DF3F51BA10A}">
+      <p15:sldGuideLst xmlns:p15="http://schemas.microsoft.com/office/powerpoint/2012/main"/>
+    </p:ext>
+  </p:extLst>
 </p:presentation>
+</file>
+
+<file path=ppt/handoutMasters/handoutMaster1.xml><?xml version="1.0" encoding="utf-8"?>
+<p:handoutMaster xmlns:a="http://schemas.openxmlformats.org/drawingml/2006/main" xmlns:r="http://schemas.openxmlformats.org/officeDocument/2006/relationships" xmlns:p="http://schemas.openxmlformats.org/presentationml/2006/main">
+  <p:cSld>
+    <p:bg>
+      <p:bgRef idx="1001">
+        <a:schemeClr val="bg1"/>
+      </p:bgRef>
+    </p:bg>
+    <p:spTree>
+      <p:nvGrpSpPr>
+        <p:cNvPr id="1" name=""/>
+        <p:cNvGrpSpPr/>
+        <p:nvPr/>
+      </p:nvGrpSpPr>
+      <p:grpSpPr>
+        <a:xfrm>
+          <a:off x="0" y="0"/>
+          <a:ext cx="0" cy="0"/>
+          <a:chOff x="0" y="0"/>
+          <a:chExt cx="0" cy="0"/>
+        </a:xfrm>
+      </p:grpSpPr>
+      <p:sp>
+        <p:nvSpPr>
+          <p:cNvPr id="2" name="ヘッダー プレースホルダー 1"/>
+          <p:cNvSpPr>
+            <a:spLocks noGrp="1"/>
+          </p:cNvSpPr>
+          <p:nvPr>
+            <p:ph type="hdr" sz="quarter"/>
+          </p:nvPr>
+        </p:nvSpPr>
+        <p:spPr>
+          <a:xfrm>
+            <a:off x="0" y="1"/>
+            <a:ext cx="4302231" cy="341064"/>
+          </a:xfrm>
+          <a:prstGeom prst="rect">
+            <a:avLst/>
+          </a:prstGeom>
+        </p:spPr>
+        <p:txBody>
+          <a:bodyPr vert="horz" lIns="91440" tIns="45720" rIns="91440" bIns="45720" rtlCol="0"/>
+          <a:lstStyle>
+            <a:lvl1pPr algn="l">
+              <a:defRPr sz="1200"/>
+            </a:lvl1pPr>
+          </a:lstStyle>
+          <a:p>
+            <a:endParaRPr kumimoji="1" lang="ja-JP" altLang="en-US"/>
+          </a:p>
+        </p:txBody>
+      </p:sp>
+      <p:sp>
+        <p:nvSpPr>
+          <p:cNvPr id="3" name="日付プレースホルダー 2"/>
+          <p:cNvSpPr>
+            <a:spLocks noGrp="1"/>
+          </p:cNvSpPr>
+          <p:nvPr>
+            <p:ph type="dt" sz="quarter" idx="1"/>
+          </p:nvPr>
+        </p:nvSpPr>
+        <p:spPr>
+          <a:xfrm>
+            <a:off x="5623697" y="1"/>
+            <a:ext cx="4302231" cy="341064"/>
+          </a:xfrm>
+          <a:prstGeom prst="rect">
+            <a:avLst/>
+          </a:prstGeom>
+        </p:spPr>
+        <p:txBody>
+          <a:bodyPr vert="horz" lIns="91440" tIns="45720" rIns="91440" bIns="45720" rtlCol="0"/>
+          <a:lstStyle>
+            <a:lvl1pPr algn="r">
+              <a:defRPr sz="1200"/>
+            </a:lvl1pPr>
+          </a:lstStyle>
+          <a:p>
+            <a:fld id="{9084CED1-528E-4E08-905E-44C8D64971E8}" type="datetimeFigureOut">
+              <a:rPr kumimoji="1" lang="ja-JP" altLang="en-US" smtClean="0"/>
+              <a:t>2018/6/5</a:t>
+            </a:fld>
+            <a:endParaRPr kumimoji="1" lang="ja-JP" altLang="en-US"/>
+          </a:p>
+        </p:txBody>
+      </p:sp>
+      <p:sp>
+        <p:nvSpPr>
+          <p:cNvPr id="4" name="フッター プレースホルダー 3"/>
+          <p:cNvSpPr>
+            <a:spLocks noGrp="1"/>
+          </p:cNvSpPr>
+          <p:nvPr>
+            <p:ph type="ftr" sz="quarter" idx="2"/>
+          </p:nvPr>
+        </p:nvSpPr>
+        <p:spPr>
+          <a:xfrm>
+            <a:off x="0" y="6456612"/>
+            <a:ext cx="4302231" cy="341063"/>
+          </a:xfrm>
+          <a:prstGeom prst="rect">
+            <a:avLst/>
+          </a:prstGeom>
+        </p:spPr>
+        <p:txBody>
+          <a:bodyPr vert="horz" lIns="91440" tIns="45720" rIns="91440" bIns="45720" rtlCol="0" anchor="b"/>
+          <a:lstStyle>
+            <a:lvl1pPr algn="l">
+              <a:defRPr sz="1200"/>
+            </a:lvl1pPr>
+          </a:lstStyle>
+          <a:p>
+            <a:endParaRPr kumimoji="1" lang="ja-JP" altLang="en-US"/>
+          </a:p>
+        </p:txBody>
+      </p:sp>
+      <p:sp>
+        <p:nvSpPr>
+          <p:cNvPr id="5" name="スライド番号プレースホルダー 4"/>
+          <p:cNvSpPr>
+            <a:spLocks noGrp="1"/>
+          </p:cNvSpPr>
+          <p:nvPr>
+            <p:ph type="sldNum" sz="quarter" idx="3"/>
+          </p:nvPr>
+        </p:nvSpPr>
+        <p:spPr>
+          <a:xfrm>
+            <a:off x="5623697" y="6456612"/>
+            <a:ext cx="4302231" cy="341063"/>
+          </a:xfrm>
+          <a:prstGeom prst="rect">
+            <a:avLst/>
+          </a:prstGeom>
+        </p:spPr>
+        <p:txBody>
+          <a:bodyPr vert="horz" lIns="91440" tIns="45720" rIns="91440" bIns="45720" rtlCol="0" anchor="b"/>
+          <a:lstStyle>
+            <a:lvl1pPr algn="r">
+              <a:defRPr sz="1200"/>
+            </a:lvl1pPr>
+          </a:lstStyle>
+          <a:p>
+            <a:fld id="{9D8D54CF-1911-4500-A0E5-D70EEF5F27A0}" type="slidenum">
+              <a:rPr kumimoji="1" lang="ja-JP" altLang="en-US" smtClean="0"/>
+              <a:t>‹#›</a:t>
+            </a:fld>
+            <a:endParaRPr kumimoji="1" lang="ja-JP" altLang="en-US"/>
+          </a:p>
+        </p:txBody>
+      </p:sp>
+    </p:spTree>
+    <p:extLst>
+      <p:ext uri="{BB962C8B-B14F-4D97-AF65-F5344CB8AC3E}">
+        <p14:creationId xmlns:p14="http://schemas.microsoft.com/office/powerpoint/2010/main" val="3911490338"/>
+      </p:ext>
+    </p:extLst>
+  </p:cSld>
+  <p:clrMap bg1="lt1" tx1="dk1" bg2="lt2" tx2="dk2" accent1="accent1" accent2="accent2" accent3="accent3" accent4="accent4" accent5="accent5" accent6="accent6" hlink="hlink" folHlink="folHlink"/>
+</p:handoutMaster>
 </file>
 
 <file path=ppt/notesMasters/notesMaster1.xml><?xml version="1.0" encoding="utf-8"?>
@@ -151,8 +330,8 @@
         </p:nvSpPr>
         <p:spPr>
           <a:xfrm>
-            <a:off x="0" y="0"/>
-            <a:ext cx="2971800" cy="458788"/>
+            <a:off x="0" y="1"/>
+            <a:ext cx="4302231" cy="341064"/>
           </a:xfrm>
           <a:prstGeom prst="rect">
             <a:avLst/>
@@ -182,8 +361,8 @@
         </p:nvSpPr>
         <p:spPr>
           <a:xfrm>
-            <a:off x="3884613" y="0"/>
-            <a:ext cx="2971800" cy="458788"/>
+            <a:off x="5623697" y="1"/>
+            <a:ext cx="4302231" cy="341064"/>
           </a:xfrm>
           <a:prstGeom prst="rect">
             <a:avLst/>
@@ -199,7 +378,7 @@
           <a:p>
             <a:fld id="{FF5D5997-B3A0-4106-A38D-DD882F94FE63}" type="datetimeFigureOut">
               <a:rPr kumimoji="1" lang="ja-JP" altLang="en-US" smtClean="0"/>
-              <a:t>2018/5/28</a:t>
+              <a:t>2018/6/5</a:t>
             </a:fld>
             <a:endParaRPr kumimoji="1" lang="ja-JP" altLang="en-US"/>
           </a:p>
@@ -217,8 +396,8 @@
         </p:nvSpPr>
         <p:spPr>
           <a:xfrm>
-            <a:off x="685800" y="1143000"/>
-            <a:ext cx="5486400" cy="3086100"/>
+            <a:off x="2925763" y="849313"/>
+            <a:ext cx="4076700" cy="2293937"/>
           </a:xfrm>
           <a:prstGeom prst="rect">
             <a:avLst/>
@@ -250,8 +429,8 @@
         </p:nvSpPr>
         <p:spPr>
           <a:xfrm>
-            <a:off x="685800" y="4400550"/>
-            <a:ext cx="5486400" cy="3600450"/>
+            <a:off x="992823" y="3271381"/>
+            <a:ext cx="7942580" cy="2676585"/>
           </a:xfrm>
           <a:prstGeom prst="rect">
             <a:avLst/>
@@ -342,8 +521,8 @@
         </p:nvSpPr>
         <p:spPr>
           <a:xfrm>
-            <a:off x="0" y="8685213"/>
-            <a:ext cx="2971800" cy="458787"/>
+            <a:off x="0" y="6456612"/>
+            <a:ext cx="4302231" cy="341063"/>
           </a:xfrm>
           <a:prstGeom prst="rect">
             <a:avLst/>
@@ -373,8 +552,8 @@
         </p:nvSpPr>
         <p:spPr>
           <a:xfrm>
-            <a:off x="3884613" y="8685213"/>
-            <a:ext cx="2971800" cy="458787"/>
+            <a:off x="5623697" y="6456612"/>
+            <a:ext cx="4302231" cy="341063"/>
           </a:xfrm>
           <a:prstGeom prst="rect">
             <a:avLst/>
@@ -714,7 +893,7 @@
           <a:p>
             <a:fld id="{728413AC-3794-41EA-AAE1-EDDB786A94F3}" type="datetime1">
               <a:rPr kumimoji="1" lang="ja-JP" altLang="en-US" smtClean="0"/>
-              <a:t>2018/5/28</a:t>
+              <a:t>2018/6/5</a:t>
             </a:fld>
             <a:endParaRPr kumimoji="1" lang="ja-JP" altLang="en-US"/>
           </a:p>
@@ -916,7 +1095,7 @@
           <a:p>
             <a:fld id="{11C7BD12-F1A8-4599-B223-DEADE110F65E}" type="datetime1">
               <a:rPr kumimoji="1" lang="ja-JP" altLang="en-US" smtClean="0"/>
-              <a:t>2018/5/28</a:t>
+              <a:t>2018/6/5</a:t>
             </a:fld>
             <a:endParaRPr kumimoji="1" lang="ja-JP" altLang="en-US"/>
           </a:p>
@@ -1128,7 +1307,7 @@
           <a:p>
             <a:fld id="{AB328229-0760-4BDD-84A7-BB873B5BD9F2}" type="datetime1">
               <a:rPr kumimoji="1" lang="ja-JP" altLang="en-US" smtClean="0"/>
-              <a:t>2018/5/28</a:t>
+              <a:t>2018/6/5</a:t>
             </a:fld>
             <a:endParaRPr kumimoji="1" lang="ja-JP" altLang="en-US"/>
           </a:p>
@@ -1330,7 +1509,7 @@
           <a:p>
             <a:fld id="{0BBD93DA-B5F3-4365-9824-94336D3F37A1}" type="datetime1">
               <a:rPr kumimoji="1" lang="ja-JP" altLang="en-US" smtClean="0"/>
-              <a:t>2018/5/28</a:t>
+              <a:t>2018/6/5</a:t>
             </a:fld>
             <a:endParaRPr kumimoji="1" lang="ja-JP" altLang="en-US"/>
           </a:p>
@@ -1576,7 +1755,7 @@
           <a:p>
             <a:fld id="{9C804347-BFE5-49C7-A9F2-9B80E21985AB}" type="datetime1">
               <a:rPr kumimoji="1" lang="ja-JP" altLang="en-US" smtClean="0"/>
-              <a:t>2018/5/28</a:t>
+              <a:t>2018/6/5</a:t>
             </a:fld>
             <a:endParaRPr kumimoji="1" lang="ja-JP" altLang="en-US"/>
           </a:p>
@@ -1872,7 +2051,7 @@
           <a:p>
             <a:fld id="{C1BEBA88-7C2B-446C-B633-7CF1FE207BB3}" type="datetime1">
               <a:rPr kumimoji="1" lang="ja-JP" altLang="en-US" smtClean="0"/>
-              <a:t>2018/5/28</a:t>
+              <a:t>2018/6/5</a:t>
             </a:fld>
             <a:endParaRPr kumimoji="1" lang="ja-JP" altLang="en-US"/>
           </a:p>
@@ -2303,7 +2482,7 @@
           <a:p>
             <a:fld id="{C00B4DCF-8314-4184-9C28-959989072AA1}" type="datetime1">
               <a:rPr kumimoji="1" lang="ja-JP" altLang="en-US" smtClean="0"/>
-              <a:t>2018/5/28</a:t>
+              <a:t>2018/6/5</a:t>
             </a:fld>
             <a:endParaRPr kumimoji="1" lang="ja-JP" altLang="en-US"/>
           </a:p>
@@ -2421,7 +2600,7 @@
           <a:p>
             <a:fld id="{5DD4CCFE-638F-4368-B477-9B610050B142}" type="datetime1">
               <a:rPr kumimoji="1" lang="ja-JP" altLang="en-US" smtClean="0"/>
-              <a:t>2018/5/28</a:t>
+              <a:t>2018/6/5</a:t>
             </a:fld>
             <a:endParaRPr kumimoji="1" lang="ja-JP" altLang="en-US"/>
           </a:p>
@@ -2516,7 +2695,7 @@
           <a:p>
             <a:fld id="{A105C32C-3EC8-4718-B18D-F7EC1145CBA7}" type="datetime1">
               <a:rPr kumimoji="1" lang="ja-JP" altLang="en-US" smtClean="0"/>
-              <a:t>2018/5/28</a:t>
+              <a:t>2018/6/5</a:t>
             </a:fld>
             <a:endParaRPr kumimoji="1" lang="ja-JP" altLang="en-US"/>
           </a:p>
@@ -2825,7 +3004,7 @@
           <a:p>
             <a:fld id="{33D62827-A4C4-4CE0-B8F4-6CD11B6EC94B}" type="datetime1">
               <a:rPr kumimoji="1" lang="ja-JP" altLang="en-US" smtClean="0"/>
-              <a:t>2018/5/28</a:t>
+              <a:t>2018/6/5</a:t>
             </a:fld>
             <a:endParaRPr kumimoji="1" lang="ja-JP" altLang="en-US"/>
           </a:p>
@@ -3078,7 +3257,7 @@
           <a:p>
             <a:fld id="{17CF9A76-7759-44CA-9336-01B1307962D6}" type="datetime1">
               <a:rPr kumimoji="1" lang="ja-JP" altLang="en-US" smtClean="0"/>
-              <a:t>2018/5/28</a:t>
+              <a:t>2018/6/5</a:t>
             </a:fld>
             <a:endParaRPr kumimoji="1" lang="ja-JP" altLang="en-US"/>
           </a:p>
@@ -3323,7 +3502,7 @@
           <a:p>
             <a:fld id="{0C7EB27D-7512-49B6-83E9-983DBA2F193D}" type="datetime1">
               <a:rPr kumimoji="1" lang="ja-JP" altLang="en-US" smtClean="0"/>
-              <a:t>2018/5/28</a:t>
+              <a:t>2018/6/5</a:t>
             </a:fld>
             <a:endParaRPr kumimoji="1" lang="ja-JP" altLang="en-US"/>
           </a:p>
@@ -3829,6 +4008,846 @@
 </p:sld>
 </file>
 
+<file path=ppt/slides/slide10.xml><?xml version="1.0" encoding="utf-8"?>
+<p:sld xmlns:a="http://schemas.openxmlformats.org/drawingml/2006/main" xmlns:r="http://schemas.openxmlformats.org/officeDocument/2006/relationships" xmlns:p="http://schemas.openxmlformats.org/presentationml/2006/main">
+  <p:cSld>
+    <p:spTree>
+      <p:nvGrpSpPr>
+        <p:cNvPr id="1" name=""/>
+        <p:cNvGrpSpPr/>
+        <p:nvPr/>
+      </p:nvGrpSpPr>
+      <p:grpSpPr>
+        <a:xfrm>
+          <a:off x="0" y="0"/>
+          <a:ext cx="0" cy="0"/>
+          <a:chOff x="0" y="0"/>
+          <a:chExt cx="0" cy="0"/>
+        </a:xfrm>
+      </p:grpSpPr>
+      <p:sp>
+        <p:nvSpPr>
+          <p:cNvPr id="2" name="タイトル 1"/>
+          <p:cNvSpPr>
+            <a:spLocks noGrp="1"/>
+          </p:cNvSpPr>
+          <p:nvPr>
+            <p:ph type="title"/>
+          </p:nvPr>
+        </p:nvSpPr>
+        <p:spPr/>
+        <p:txBody>
+          <a:bodyPr/>
+          <a:lstStyle/>
+          <a:p>
+            <a:r>
+              <a:rPr kumimoji="1" lang="en-US" altLang="ja-JP" dirty="0" smtClean="0"/>
+              <a:t>Filling ghost cell</a:t>
+            </a:r>
+            <a:endParaRPr kumimoji="1" lang="ja-JP" altLang="en-US" dirty="0"/>
+          </a:p>
+        </p:txBody>
+      </p:sp>
+      <p:sp>
+        <p:nvSpPr>
+          <p:cNvPr id="3" name="コンテンツ プレースホルダー 2"/>
+          <p:cNvSpPr>
+            <a:spLocks noGrp="1"/>
+          </p:cNvSpPr>
+          <p:nvPr>
+            <p:ph idx="1"/>
+          </p:nvPr>
+        </p:nvSpPr>
+        <p:spPr/>
+        <p:txBody>
+          <a:bodyPr/>
+          <a:lstStyle/>
+          <a:p>
+            <a:r>
+              <a:rPr kumimoji="1" lang="en-US" altLang="ja-JP" dirty="0" smtClean="0"/>
+              <a:t>Intra-level operations</a:t>
+            </a:r>
+          </a:p>
+          <a:p>
+            <a:pPr lvl="1"/>
+            <a:r>
+              <a:rPr kumimoji="1" lang="en-US" altLang="ja-JP" dirty="0" smtClean="0"/>
+              <a:t>Fill block boundary on same level</a:t>
+            </a:r>
+          </a:p>
+          <a:p>
+            <a:pPr lvl="1"/>
+            <a:r>
+              <a:rPr lang="en-US" altLang="ja-JP" dirty="0" smtClean="0"/>
+              <a:t>Fill physical boundary </a:t>
+            </a:r>
+          </a:p>
+          <a:p>
+            <a:pPr lvl="1"/>
+            <a:endParaRPr kumimoji="1" lang="en-US" altLang="ja-JP" dirty="0" smtClean="0"/>
+          </a:p>
+          <a:p>
+            <a:endParaRPr kumimoji="1" lang="en-US" altLang="ja-JP" dirty="0" smtClean="0"/>
+          </a:p>
+          <a:p>
+            <a:r>
+              <a:rPr lang="en-US" altLang="ja-JP" dirty="0" smtClean="0"/>
+              <a:t>Inter-level operations </a:t>
+            </a:r>
+            <a:endParaRPr lang="en-US" altLang="ja-JP" dirty="0"/>
+          </a:p>
+          <a:p>
+            <a:pPr lvl="1"/>
+            <a:r>
+              <a:rPr kumimoji="1" lang="en-US" altLang="ja-JP" dirty="0" smtClean="0"/>
+              <a:t>Fill coarse-fine boundary </a:t>
+            </a:r>
+          </a:p>
+          <a:p>
+            <a:endParaRPr kumimoji="1" lang="ja-JP" altLang="en-US" dirty="0"/>
+          </a:p>
+        </p:txBody>
+      </p:sp>
+      <p:sp>
+        <p:nvSpPr>
+          <p:cNvPr id="4" name="スライド番号プレースホルダー 3"/>
+          <p:cNvSpPr>
+            <a:spLocks noGrp="1"/>
+          </p:cNvSpPr>
+          <p:nvPr>
+            <p:ph type="sldNum" sz="quarter" idx="12"/>
+          </p:nvPr>
+        </p:nvSpPr>
+        <p:spPr/>
+        <p:txBody>
+          <a:bodyPr/>
+          <a:lstStyle/>
+          <a:p>
+            <a:fld id="{83394D8B-D218-4906-9338-12464234E02D}" type="slidenum">
+              <a:rPr kumimoji="1" lang="ja-JP" altLang="en-US" smtClean="0"/>
+              <a:t>10</a:t>
+            </a:fld>
+            <a:endParaRPr kumimoji="1" lang="ja-JP" altLang="en-US"/>
+          </a:p>
+        </p:txBody>
+      </p:sp>
+    </p:spTree>
+    <p:extLst>
+      <p:ext uri="{BB962C8B-B14F-4D97-AF65-F5344CB8AC3E}">
+        <p14:creationId xmlns:p14="http://schemas.microsoft.com/office/powerpoint/2010/main" val="2481472036"/>
+      </p:ext>
+    </p:extLst>
+  </p:cSld>
+  <p:clrMapOvr>
+    <a:masterClrMapping/>
+  </p:clrMapOvr>
+</p:sld>
+</file>
+
+<file path=ppt/slides/slide11.xml><?xml version="1.0" encoding="utf-8"?>
+<p:sld xmlns:a="http://schemas.openxmlformats.org/drawingml/2006/main" xmlns:r="http://schemas.openxmlformats.org/officeDocument/2006/relationships" xmlns:p="http://schemas.openxmlformats.org/presentationml/2006/main">
+  <p:cSld>
+    <p:spTree>
+      <p:nvGrpSpPr>
+        <p:cNvPr id="1" name=""/>
+        <p:cNvGrpSpPr/>
+        <p:nvPr/>
+      </p:nvGrpSpPr>
+      <p:grpSpPr>
+        <a:xfrm>
+          <a:off x="0" y="0"/>
+          <a:ext cx="0" cy="0"/>
+          <a:chOff x="0" y="0"/>
+          <a:chExt cx="0" cy="0"/>
+        </a:xfrm>
+      </p:grpSpPr>
+      <p:sp>
+        <p:nvSpPr>
+          <p:cNvPr id="2" name="タイトル 1"/>
+          <p:cNvSpPr>
+            <a:spLocks noGrp="1"/>
+          </p:cNvSpPr>
+          <p:nvPr>
+            <p:ph type="title"/>
+          </p:nvPr>
+        </p:nvSpPr>
+        <p:spPr/>
+        <p:txBody>
+          <a:bodyPr/>
+          <a:lstStyle/>
+          <a:p>
+            <a:r>
+              <a:rPr kumimoji="1" lang="en-US" altLang="ja-JP" dirty="0" smtClean="0"/>
+              <a:t>Concept of ‘Tower’</a:t>
+            </a:r>
+            <a:endParaRPr kumimoji="1" lang="ja-JP" altLang="en-US" dirty="0"/>
+          </a:p>
+        </p:txBody>
+      </p:sp>
+      <p:sp>
+        <p:nvSpPr>
+          <p:cNvPr id="3" name="コンテンツ プレースホルダー 2"/>
+          <p:cNvSpPr>
+            <a:spLocks noGrp="1"/>
+          </p:cNvSpPr>
+          <p:nvPr>
+            <p:ph idx="1"/>
+          </p:nvPr>
+        </p:nvSpPr>
+        <p:spPr>
+          <a:xfrm>
+            <a:off x="838200" y="1825625"/>
+            <a:ext cx="5217367" cy="4351338"/>
+          </a:xfrm>
+        </p:spPr>
+        <p:txBody>
+          <a:bodyPr/>
+          <a:lstStyle/>
+          <a:p>
+            <a:r>
+              <a:rPr kumimoji="1" lang="en-US" altLang="ja-JP" dirty="0" smtClean="0"/>
+              <a:t>Set of uncovered blocks </a:t>
+            </a:r>
+          </a:p>
+          <a:p>
+            <a:pPr lvl="1"/>
+            <a:r>
+              <a:rPr lang="en-US" altLang="ja-JP" dirty="0" smtClean="0"/>
+              <a:t>The highest tower is simply the collection of all leaf blocks </a:t>
+            </a:r>
+          </a:p>
+          <a:p>
+            <a:pPr lvl="1"/>
+            <a:r>
+              <a:rPr lang="en-US" altLang="ja-JP" dirty="0" smtClean="0"/>
+              <a:t>The </a:t>
+            </a:r>
+            <a:r>
+              <a:rPr lang="en-US" altLang="ja-JP" dirty="0" err="1" smtClean="0"/>
+              <a:t>i-th</a:t>
+            </a:r>
+            <a:r>
+              <a:rPr lang="en-US" altLang="ja-JP" dirty="0" smtClean="0"/>
+              <a:t> tower is made by erasing top level of the (i+1)-</a:t>
+            </a:r>
+            <a:r>
+              <a:rPr lang="en-US" altLang="ja-JP" dirty="0" err="1" smtClean="0"/>
+              <a:t>th</a:t>
+            </a:r>
+            <a:r>
+              <a:rPr lang="en-US" altLang="ja-JP" dirty="0" smtClean="0"/>
+              <a:t> tower</a:t>
+            </a:r>
+          </a:p>
+          <a:p>
+            <a:r>
+              <a:rPr kumimoji="1" lang="en-US" altLang="ja-JP" dirty="0" smtClean="0"/>
+              <a:t>What is tower for?</a:t>
+            </a:r>
+          </a:p>
+          <a:p>
+            <a:pPr lvl="1"/>
+            <a:r>
+              <a:rPr kumimoji="1" lang="en-US" altLang="ja-JP" dirty="0" smtClean="0"/>
+              <a:t>Valid blocks need solving </a:t>
+            </a:r>
+          </a:p>
+          <a:p>
+            <a:pPr lvl="1"/>
+            <a:r>
+              <a:rPr lang="en-US" altLang="ja-JP" dirty="0" smtClean="0"/>
+              <a:t>Manage coarse-fine face flux </a:t>
+            </a:r>
+            <a:endParaRPr kumimoji="1" lang="en-US" altLang="ja-JP" dirty="0" smtClean="0"/>
+          </a:p>
+          <a:p>
+            <a:pPr lvl="1"/>
+            <a:r>
+              <a:rPr lang="en-US" altLang="ja-JP" dirty="0" smtClean="0"/>
+              <a:t>Natural multi-level grids</a:t>
+            </a:r>
+            <a:endParaRPr kumimoji="1" lang="en-US" altLang="ja-JP" dirty="0" smtClean="0"/>
+          </a:p>
+          <a:p>
+            <a:endParaRPr kumimoji="1" lang="ja-JP" altLang="en-US" dirty="0"/>
+          </a:p>
+        </p:txBody>
+      </p:sp>
+      <p:sp>
+        <p:nvSpPr>
+          <p:cNvPr id="4" name="スライド番号プレースホルダー 3"/>
+          <p:cNvSpPr>
+            <a:spLocks noGrp="1"/>
+          </p:cNvSpPr>
+          <p:nvPr>
+            <p:ph type="sldNum" sz="quarter" idx="12"/>
+          </p:nvPr>
+        </p:nvSpPr>
+        <p:spPr/>
+        <p:txBody>
+          <a:bodyPr/>
+          <a:lstStyle/>
+          <a:p>
+            <a:fld id="{83394D8B-D218-4906-9338-12464234E02D}" type="slidenum">
+              <a:rPr kumimoji="1" lang="ja-JP" altLang="en-US" smtClean="0"/>
+              <a:t>11</a:t>
+            </a:fld>
+            <a:endParaRPr kumimoji="1" lang="ja-JP" altLang="en-US"/>
+          </a:p>
+        </p:txBody>
+      </p:sp>
+      <p:pic>
+        <p:nvPicPr>
+          <p:cNvPr id="5" name="図 4"/>
+          <p:cNvPicPr>
+            <a:picLocks noChangeAspect="1"/>
+          </p:cNvPicPr>
+          <p:nvPr/>
+        </p:nvPicPr>
+        <p:blipFill>
+          <a:blip r:embed="rId2" cstate="print">
+            <a:extLst>
+              <a:ext uri="{28A0092B-C50C-407E-A947-70E740481C1C}">
+                <a14:useLocalDpi xmlns:a14="http://schemas.microsoft.com/office/drawing/2010/main" val="0"/>
+              </a:ext>
+            </a:extLst>
+          </a:blip>
+          <a:stretch>
+            <a:fillRect/>
+          </a:stretch>
+        </p:blipFill>
+        <p:spPr>
+          <a:xfrm>
+            <a:off x="6850273" y="514751"/>
+            <a:ext cx="2880000" cy="1310874"/>
+          </a:xfrm>
+          <a:prstGeom prst="rect">
+            <a:avLst/>
+          </a:prstGeom>
+        </p:spPr>
+      </p:pic>
+      <p:pic>
+        <p:nvPicPr>
+          <p:cNvPr id="6" name="図 5"/>
+          <p:cNvPicPr>
+            <a:picLocks noChangeAspect="1"/>
+          </p:cNvPicPr>
+          <p:nvPr/>
+        </p:nvPicPr>
+        <p:blipFill>
+          <a:blip r:embed="rId3" cstate="print">
+            <a:extLst>
+              <a:ext uri="{28A0092B-C50C-407E-A947-70E740481C1C}">
+                <a14:useLocalDpi xmlns:a14="http://schemas.microsoft.com/office/drawing/2010/main" val="0"/>
+              </a:ext>
+            </a:extLst>
+          </a:blip>
+          <a:stretch>
+            <a:fillRect/>
+          </a:stretch>
+        </p:blipFill>
+        <p:spPr>
+          <a:xfrm>
+            <a:off x="6850273" y="1975251"/>
+            <a:ext cx="2880000" cy="1310874"/>
+          </a:xfrm>
+          <a:prstGeom prst="rect">
+            <a:avLst/>
+          </a:prstGeom>
+        </p:spPr>
+      </p:pic>
+      <p:pic>
+        <p:nvPicPr>
+          <p:cNvPr id="7" name="図 6"/>
+          <p:cNvPicPr>
+            <a:picLocks noChangeAspect="1"/>
+          </p:cNvPicPr>
+          <p:nvPr/>
+        </p:nvPicPr>
+        <p:blipFill>
+          <a:blip r:embed="rId4" cstate="print">
+            <a:extLst>
+              <a:ext uri="{28A0092B-C50C-407E-A947-70E740481C1C}">
+                <a14:useLocalDpi xmlns:a14="http://schemas.microsoft.com/office/drawing/2010/main" val="0"/>
+              </a:ext>
+            </a:extLst>
+          </a:blip>
+          <a:stretch>
+            <a:fillRect/>
+          </a:stretch>
+        </p:blipFill>
+        <p:spPr>
+          <a:xfrm>
+            <a:off x="6850273" y="4896251"/>
+            <a:ext cx="2880000" cy="1310874"/>
+          </a:xfrm>
+          <a:prstGeom prst="rect">
+            <a:avLst/>
+          </a:prstGeom>
+        </p:spPr>
+      </p:pic>
+      <p:pic>
+        <p:nvPicPr>
+          <p:cNvPr id="8" name="図 7"/>
+          <p:cNvPicPr>
+            <a:picLocks noChangeAspect="1"/>
+          </p:cNvPicPr>
+          <p:nvPr/>
+        </p:nvPicPr>
+        <p:blipFill>
+          <a:blip r:embed="rId5" cstate="print">
+            <a:extLst>
+              <a:ext uri="{28A0092B-C50C-407E-A947-70E740481C1C}">
+                <a14:useLocalDpi xmlns:a14="http://schemas.microsoft.com/office/drawing/2010/main" val="0"/>
+              </a:ext>
+            </a:extLst>
+          </a:blip>
+          <a:stretch>
+            <a:fillRect/>
+          </a:stretch>
+        </p:blipFill>
+        <p:spPr>
+          <a:xfrm>
+            <a:off x="6850273" y="3435751"/>
+            <a:ext cx="2880000" cy="1310874"/>
+          </a:xfrm>
+          <a:prstGeom prst="rect">
+            <a:avLst/>
+          </a:prstGeom>
+        </p:spPr>
+      </p:pic>
+    </p:spTree>
+    <p:extLst>
+      <p:ext uri="{BB962C8B-B14F-4D97-AF65-F5344CB8AC3E}">
+        <p14:creationId xmlns:p14="http://schemas.microsoft.com/office/powerpoint/2010/main" val="42682091"/>
+      </p:ext>
+    </p:extLst>
+  </p:cSld>
+  <p:clrMapOvr>
+    <a:masterClrMapping/>
+  </p:clrMapOvr>
+</p:sld>
+</file>
+
+<file path=ppt/slides/slide12.xml><?xml version="1.0" encoding="utf-8"?>
+<p:sld xmlns:a="http://schemas.openxmlformats.org/drawingml/2006/main" xmlns:r="http://schemas.openxmlformats.org/officeDocument/2006/relationships" xmlns:p="http://schemas.openxmlformats.org/presentationml/2006/main">
+  <p:cSld>
+    <p:spTree>
+      <p:nvGrpSpPr>
+        <p:cNvPr id="1" name=""/>
+        <p:cNvGrpSpPr/>
+        <p:nvPr/>
+      </p:nvGrpSpPr>
+      <p:grpSpPr>
+        <a:xfrm>
+          <a:off x="0" y="0"/>
+          <a:ext cx="0" cy="0"/>
+          <a:chOff x="0" y="0"/>
+          <a:chExt cx="0" cy="0"/>
+        </a:xfrm>
+      </p:grpSpPr>
+      <p:sp>
+        <p:nvSpPr>
+          <p:cNvPr id="2" name="タイトル 1"/>
+          <p:cNvSpPr>
+            <a:spLocks noGrp="1"/>
+          </p:cNvSpPr>
+          <p:nvPr>
+            <p:ph type="title"/>
+          </p:nvPr>
+        </p:nvSpPr>
+        <p:spPr/>
+        <p:txBody>
+          <a:bodyPr/>
+          <a:lstStyle/>
+          <a:p>
+            <a:r>
+              <a:rPr kumimoji="1" lang="en-US" altLang="ja-JP" dirty="0" smtClean="0"/>
+              <a:t>MAC solver</a:t>
+            </a:r>
+            <a:endParaRPr kumimoji="1" lang="ja-JP" altLang="en-US" dirty="0"/>
+          </a:p>
+        </p:txBody>
+      </p:sp>
+      <p:sp>
+        <p:nvSpPr>
+          <p:cNvPr id="3" name="コンテンツ プレースホルダー 2"/>
+          <p:cNvSpPr>
+            <a:spLocks noGrp="1"/>
+          </p:cNvSpPr>
+          <p:nvPr>
+            <p:ph idx="1"/>
+          </p:nvPr>
+        </p:nvSpPr>
+        <p:spPr/>
+        <p:txBody>
+          <a:bodyPr/>
+          <a:lstStyle/>
+          <a:p>
+            <a:r>
+              <a:rPr kumimoji="1" lang="en-US" altLang="ja-JP" dirty="0" smtClean="0"/>
+              <a:t>Extensively use Tower</a:t>
+            </a:r>
+          </a:p>
+          <a:p>
+            <a:r>
+              <a:rPr lang="en-US" altLang="ja-JP" dirty="0" smtClean="0"/>
+              <a:t>Only first-order at coarse/fine face </a:t>
+            </a:r>
+          </a:p>
+          <a:p>
+            <a:r>
+              <a:rPr lang="en-US" altLang="ja-JP" dirty="0" smtClean="0"/>
+              <a:t>Can help compute flux of solution</a:t>
+            </a:r>
+          </a:p>
+          <a:p>
+            <a:endParaRPr lang="en-US" altLang="ja-JP" dirty="0"/>
+          </a:p>
+          <a:p>
+            <a:r>
+              <a:rPr kumimoji="1" lang="en-US" altLang="ja-JP" dirty="0" smtClean="0"/>
+              <a:t>MG precondition</a:t>
+            </a:r>
+          </a:p>
+          <a:p>
+            <a:pPr lvl="1"/>
+            <a:r>
+              <a:rPr lang="en-US" altLang="ja-JP" dirty="0" smtClean="0"/>
+              <a:t>Levels of towers as </a:t>
+            </a:r>
+            <a:r>
+              <a:rPr lang="en-US" altLang="ja-JP" dirty="0" err="1" smtClean="0"/>
+              <a:t>multigrids</a:t>
+            </a:r>
+            <a:r>
+              <a:rPr lang="en-US" altLang="ja-JP" dirty="0" smtClean="0"/>
+              <a:t> </a:t>
+            </a:r>
+          </a:p>
+          <a:p>
+            <a:pPr lvl="1"/>
+            <a:r>
+              <a:rPr lang="en-US" altLang="ja-JP" dirty="0" smtClean="0"/>
+              <a:t>GS as smoother, bottom use CG</a:t>
+            </a:r>
+          </a:p>
+          <a:p>
+            <a:r>
+              <a:rPr kumimoji="1" lang="en-US" altLang="ja-JP" dirty="0" smtClean="0"/>
+              <a:t>CG solver</a:t>
+            </a:r>
+          </a:p>
+          <a:p>
+            <a:endParaRPr kumimoji="1" lang="ja-JP" altLang="en-US" dirty="0"/>
+          </a:p>
+        </p:txBody>
+      </p:sp>
+      <p:sp>
+        <p:nvSpPr>
+          <p:cNvPr id="4" name="スライド番号プレースホルダー 3"/>
+          <p:cNvSpPr>
+            <a:spLocks noGrp="1"/>
+          </p:cNvSpPr>
+          <p:nvPr>
+            <p:ph type="sldNum" sz="quarter" idx="12"/>
+          </p:nvPr>
+        </p:nvSpPr>
+        <p:spPr/>
+        <p:txBody>
+          <a:bodyPr/>
+          <a:lstStyle/>
+          <a:p>
+            <a:fld id="{83394D8B-D218-4906-9338-12464234E02D}" type="slidenum">
+              <a:rPr kumimoji="1" lang="ja-JP" altLang="en-US" smtClean="0"/>
+              <a:t>12</a:t>
+            </a:fld>
+            <a:endParaRPr kumimoji="1" lang="ja-JP" altLang="en-US"/>
+          </a:p>
+        </p:txBody>
+      </p:sp>
+    </p:spTree>
+    <p:extLst>
+      <p:ext uri="{BB962C8B-B14F-4D97-AF65-F5344CB8AC3E}">
+        <p14:creationId xmlns:p14="http://schemas.microsoft.com/office/powerpoint/2010/main" val="994964334"/>
+      </p:ext>
+    </p:extLst>
+  </p:cSld>
+  <p:clrMapOvr>
+    <a:masterClrMapping/>
+  </p:clrMapOvr>
+</p:sld>
+</file>
+
+<file path=ppt/slides/slide13.xml><?xml version="1.0" encoding="utf-8"?>
+<p:sld xmlns:a="http://schemas.openxmlformats.org/drawingml/2006/main" xmlns:r="http://schemas.openxmlformats.org/officeDocument/2006/relationships" xmlns:p="http://schemas.openxmlformats.org/presentationml/2006/main">
+  <p:cSld>
+    <p:spTree>
+      <p:nvGrpSpPr>
+        <p:cNvPr id="1" name=""/>
+        <p:cNvGrpSpPr/>
+        <p:nvPr/>
+      </p:nvGrpSpPr>
+      <p:grpSpPr>
+        <a:xfrm>
+          <a:off x="0" y="0"/>
+          <a:ext cx="0" cy="0"/>
+          <a:chOff x="0" y="0"/>
+          <a:chExt cx="0" cy="0"/>
+        </a:xfrm>
+      </p:grpSpPr>
+      <p:sp>
+        <p:nvSpPr>
+          <p:cNvPr id="2" name="タイトル 1"/>
+          <p:cNvSpPr>
+            <a:spLocks noGrp="1"/>
+          </p:cNvSpPr>
+          <p:nvPr>
+            <p:ph type="title"/>
+          </p:nvPr>
+        </p:nvSpPr>
+        <p:spPr/>
+        <p:txBody>
+          <a:bodyPr/>
+          <a:lstStyle/>
+          <a:p>
+            <a:r>
+              <a:rPr kumimoji="1" lang="en-US" altLang="ja-JP" dirty="0" smtClean="0"/>
+              <a:t>Output and visualization</a:t>
+            </a:r>
+            <a:endParaRPr kumimoji="1" lang="ja-JP" altLang="en-US" dirty="0"/>
+          </a:p>
+        </p:txBody>
+      </p:sp>
+      <p:sp>
+        <p:nvSpPr>
+          <p:cNvPr id="3" name="コンテンツ プレースホルダー 2"/>
+          <p:cNvSpPr>
+            <a:spLocks noGrp="1"/>
+          </p:cNvSpPr>
+          <p:nvPr>
+            <p:ph idx="1"/>
+          </p:nvPr>
+        </p:nvSpPr>
+        <p:spPr/>
+        <p:txBody>
+          <a:bodyPr/>
+          <a:lstStyle/>
+          <a:p>
+            <a:r>
+              <a:rPr kumimoji="1" lang="en-US" altLang="ja-JP" dirty="0" smtClean="0"/>
+              <a:t>H5 </a:t>
+            </a:r>
+            <a:r>
+              <a:rPr kumimoji="1" lang="en-US" altLang="ja-JP" dirty="0" err="1" smtClean="0"/>
+              <a:t>Chombo</a:t>
+            </a:r>
+            <a:r>
+              <a:rPr kumimoji="1" lang="en-US" altLang="ja-JP" dirty="0" smtClean="0"/>
+              <a:t> file</a:t>
+            </a:r>
+          </a:p>
+          <a:p>
+            <a:pPr lvl="1"/>
+            <a:r>
+              <a:rPr lang="en-US" altLang="ja-JP" dirty="0" err="1" smtClean="0"/>
+              <a:t>Paraview</a:t>
+            </a:r>
+            <a:r>
+              <a:rPr lang="en-US" altLang="ja-JP" dirty="0" smtClean="0"/>
+              <a:t>: choose *.h5 file -&gt; select format “CHOMBO AMR file”</a:t>
+            </a:r>
+            <a:endParaRPr kumimoji="1" lang="en-US" altLang="ja-JP" dirty="0" smtClean="0"/>
+          </a:p>
+          <a:p>
+            <a:endParaRPr kumimoji="1" lang="en-US" altLang="ja-JP" dirty="0" smtClean="0"/>
+          </a:p>
+          <a:p>
+            <a:r>
+              <a:rPr kumimoji="1" lang="en-US" altLang="ja-JP" dirty="0" smtClean="0"/>
+              <a:t>The HDF5-1.8.20 library is pre-compiled</a:t>
+            </a:r>
+          </a:p>
+          <a:p>
+            <a:endParaRPr lang="en-US" altLang="ja-JP" dirty="0"/>
+          </a:p>
+          <a:p>
+            <a:r>
+              <a:rPr lang="en-US" altLang="ja-JP" dirty="0" smtClean="0"/>
+              <a:t>If you wish, may </a:t>
+            </a:r>
+            <a:r>
+              <a:rPr lang="en-US" altLang="ja-JP" dirty="0" smtClean="0"/>
+              <a:t>also dump data to ASCII file in a level-by-level and block-by-block manner</a:t>
+            </a:r>
+            <a:endParaRPr kumimoji="1" lang="ja-JP" altLang="en-US" dirty="0"/>
+          </a:p>
+        </p:txBody>
+      </p:sp>
+      <p:sp>
+        <p:nvSpPr>
+          <p:cNvPr id="4" name="スライド番号プレースホルダー 3"/>
+          <p:cNvSpPr>
+            <a:spLocks noGrp="1"/>
+          </p:cNvSpPr>
+          <p:nvPr>
+            <p:ph type="sldNum" sz="quarter" idx="12"/>
+          </p:nvPr>
+        </p:nvSpPr>
+        <p:spPr/>
+        <p:txBody>
+          <a:bodyPr/>
+          <a:lstStyle/>
+          <a:p>
+            <a:fld id="{83394D8B-D218-4906-9338-12464234E02D}" type="slidenum">
+              <a:rPr kumimoji="1" lang="ja-JP" altLang="en-US" smtClean="0"/>
+              <a:t>13</a:t>
+            </a:fld>
+            <a:endParaRPr kumimoji="1" lang="ja-JP" altLang="en-US"/>
+          </a:p>
+        </p:txBody>
+      </p:sp>
+    </p:spTree>
+    <p:extLst>
+      <p:ext uri="{BB962C8B-B14F-4D97-AF65-F5344CB8AC3E}">
+        <p14:creationId xmlns:p14="http://schemas.microsoft.com/office/powerpoint/2010/main" val="2902767362"/>
+      </p:ext>
+    </p:extLst>
+  </p:cSld>
+  <p:clrMapOvr>
+    <a:masterClrMapping/>
+  </p:clrMapOvr>
+</p:sld>
+</file>
+
+<file path=ppt/slides/slide14.xml><?xml version="1.0" encoding="utf-8"?>
+<p:sld xmlns:a="http://schemas.openxmlformats.org/drawingml/2006/main" xmlns:r="http://schemas.openxmlformats.org/officeDocument/2006/relationships" xmlns:p="http://schemas.openxmlformats.org/presentationml/2006/main">
+  <p:cSld>
+    <p:spTree>
+      <p:nvGrpSpPr>
+        <p:cNvPr id="1" name=""/>
+        <p:cNvGrpSpPr/>
+        <p:nvPr/>
+      </p:nvGrpSpPr>
+      <p:grpSpPr>
+        <a:xfrm>
+          <a:off x="0" y="0"/>
+          <a:ext cx="0" cy="0"/>
+          <a:chOff x="0" y="0"/>
+          <a:chExt cx="0" cy="0"/>
+        </a:xfrm>
+      </p:grpSpPr>
+      <p:sp>
+        <p:nvSpPr>
+          <p:cNvPr id="2" name="タイトル 1"/>
+          <p:cNvSpPr>
+            <a:spLocks noGrp="1"/>
+          </p:cNvSpPr>
+          <p:nvPr>
+            <p:ph type="title"/>
+          </p:nvPr>
+        </p:nvSpPr>
+        <p:spPr/>
+        <p:txBody>
+          <a:bodyPr/>
+          <a:lstStyle/>
+          <a:p>
+            <a:r>
+              <a:rPr lang="en-US" altLang="ja-JP" dirty="0" smtClean="0"/>
+              <a:t>Helpful references </a:t>
+            </a:r>
+            <a:endParaRPr kumimoji="1" lang="ja-JP" altLang="en-US" dirty="0"/>
+          </a:p>
+        </p:txBody>
+      </p:sp>
+      <p:sp>
+        <p:nvSpPr>
+          <p:cNvPr id="3" name="コンテンツ プレースホルダー 2"/>
+          <p:cNvSpPr>
+            <a:spLocks noGrp="1"/>
+          </p:cNvSpPr>
+          <p:nvPr>
+            <p:ph idx="1"/>
+          </p:nvPr>
+        </p:nvSpPr>
+        <p:spPr/>
+        <p:txBody>
+          <a:bodyPr/>
+          <a:lstStyle/>
+          <a:p>
+            <a:r>
+              <a:rPr kumimoji="1" lang="en-US" altLang="ja-JP" dirty="0" smtClean="0"/>
+              <a:t>PARAMESH library</a:t>
+            </a:r>
+          </a:p>
+          <a:p>
+            <a:pPr lvl="1"/>
+            <a:r>
+              <a:rPr lang="en-US" altLang="ja-JP" dirty="0" smtClean="0"/>
+              <a:t>Fortran code, the </a:t>
+            </a:r>
+            <a:r>
+              <a:rPr lang="en-US" altLang="ja-JP" dirty="0" smtClean="0"/>
+              <a:t>original idea of this tree/block </a:t>
+            </a:r>
+            <a:r>
+              <a:rPr lang="en-US" altLang="ja-JP" dirty="0" smtClean="0"/>
+              <a:t>model</a:t>
+            </a:r>
+          </a:p>
+          <a:p>
+            <a:pPr lvl="1"/>
+            <a:r>
+              <a:rPr lang="en-US" altLang="ja-JP" dirty="0" smtClean="0"/>
+              <a:t>Unfortunately, project </a:t>
+            </a:r>
+            <a:r>
+              <a:rPr lang="en-US" altLang="ja-JP" dirty="0" smtClean="0"/>
+              <a:t>already obsolete, no longer maintained</a:t>
+            </a:r>
+            <a:endParaRPr lang="en-US" altLang="ja-JP" dirty="0"/>
+          </a:p>
+          <a:p>
+            <a:endParaRPr kumimoji="1" lang="ja-JP" altLang="en-US" dirty="0"/>
+          </a:p>
+        </p:txBody>
+      </p:sp>
+      <p:sp>
+        <p:nvSpPr>
+          <p:cNvPr id="4" name="スライド番号プレースホルダー 3"/>
+          <p:cNvSpPr>
+            <a:spLocks noGrp="1"/>
+          </p:cNvSpPr>
+          <p:nvPr>
+            <p:ph type="sldNum" sz="quarter" idx="12"/>
+          </p:nvPr>
+        </p:nvSpPr>
+        <p:spPr/>
+        <p:txBody>
+          <a:bodyPr/>
+          <a:lstStyle/>
+          <a:p>
+            <a:fld id="{83394D8B-D218-4906-9338-12464234E02D}" type="slidenum">
+              <a:rPr kumimoji="1" lang="ja-JP" altLang="en-US" smtClean="0"/>
+              <a:t>14</a:t>
+            </a:fld>
+            <a:endParaRPr kumimoji="1" lang="ja-JP" altLang="en-US"/>
+          </a:p>
+        </p:txBody>
+      </p:sp>
+    </p:spTree>
+    <p:extLst>
+      <p:ext uri="{BB962C8B-B14F-4D97-AF65-F5344CB8AC3E}">
+        <p14:creationId xmlns:p14="http://schemas.microsoft.com/office/powerpoint/2010/main" val="3521176185"/>
+      </p:ext>
+    </p:extLst>
+  </p:cSld>
+  <p:clrMapOvr>
+    <a:masterClrMapping/>
+  </p:clrMapOvr>
+</p:sld>
+</file>
+
 <file path=ppt/slides/slide2.xml><?xml version="1.0" encoding="utf-8"?>
 <p:sld xmlns:a="http://schemas.openxmlformats.org/drawingml/2006/main" xmlns:r="http://schemas.openxmlformats.org/officeDocument/2006/relationships" xmlns:p="http://schemas.openxmlformats.org/presentationml/2006/main">
   <p:cSld>
@@ -3861,6 +4880,10 @@
           <a:bodyPr/>
           <a:lstStyle/>
           <a:p>
+            <a:r>
+              <a:rPr kumimoji="1" lang="en-US" altLang="ja-JP" dirty="0" smtClean="0"/>
+              <a:t>SAYAKA’s strategy: tree/block mixed AMR grid </a:t>
+            </a:r>
             <a:endParaRPr kumimoji="1" lang="ja-JP" altLang="en-US" dirty="0"/>
           </a:p>
         </p:txBody>
@@ -3875,15 +4898,76 @@
             <p:ph idx="1"/>
           </p:nvPr>
         </p:nvSpPr>
-        <p:spPr/>
+        <p:spPr>
+          <a:xfrm>
+            <a:off x="838200" y="1825625"/>
+            <a:ext cx="5599922" cy="4351338"/>
+          </a:xfrm>
+        </p:spPr>
         <p:txBody>
           <a:bodyPr/>
           <a:lstStyle/>
           <a:p>
             <a:r>
               <a:rPr kumimoji="1" lang="en-US" altLang="ja-JP" dirty="0" smtClean="0"/>
-              <a:t>Tree/block mixed</a:t>
-            </a:r>
+              <a:t>Tree representation of refine levels </a:t>
+            </a:r>
+          </a:p>
+          <a:p>
+            <a:pPr lvl="1"/>
+            <a:r>
+              <a:rPr lang="en-US" altLang="ja-JP" dirty="0" smtClean="0"/>
+              <a:t>Quad-tree (2D) and Oct-tree (3D)</a:t>
+            </a:r>
+          </a:p>
+          <a:p>
+            <a:pPr lvl="1"/>
+            <a:r>
+              <a:rPr kumimoji="1" lang="en-US" altLang="ja-JP" dirty="0" smtClean="0"/>
+              <a:t>Tree node </a:t>
+            </a:r>
+            <a:endParaRPr lang="en-US" altLang="ja-JP" dirty="0"/>
+          </a:p>
+          <a:p>
+            <a:pPr lvl="2"/>
+            <a:r>
+              <a:rPr kumimoji="1" lang="en-US" altLang="ja-JP" dirty="0" smtClean="0"/>
+              <a:t>Parent node</a:t>
+            </a:r>
+          </a:p>
+          <a:p>
+            <a:pPr lvl="2"/>
+            <a:r>
+              <a:rPr lang="en-US" altLang="ja-JP" dirty="0" smtClean="0"/>
+              <a:t>Leaf node</a:t>
+            </a:r>
+          </a:p>
+          <a:p>
+            <a:pPr lvl="1"/>
+            <a:endParaRPr kumimoji="1" lang="en-US" altLang="ja-JP" dirty="0" smtClean="0"/>
+          </a:p>
+          <a:p>
+            <a:r>
+              <a:rPr kumimoji="1" lang="en-US" altLang="ja-JP" dirty="0" smtClean="0"/>
+              <a:t>Block data in each tree node </a:t>
+            </a:r>
+          </a:p>
+          <a:p>
+            <a:pPr lvl="1"/>
+            <a:r>
+              <a:rPr lang="en-US" altLang="ja-JP" dirty="0" smtClean="0"/>
+              <a:t>Uniform grid </a:t>
+            </a:r>
+          </a:p>
+          <a:p>
+            <a:pPr lvl="1"/>
+            <a:r>
+              <a:rPr lang="en-US" altLang="ja-JP" dirty="0" smtClean="0"/>
+              <a:t>Refined by a factor of two each level</a:t>
+            </a:r>
+            <a:endParaRPr lang="en-US" altLang="ja-JP" dirty="0"/>
+          </a:p>
+          <a:p>
             <a:endParaRPr kumimoji="1" lang="ja-JP" altLang="en-US" dirty="0"/>
           </a:p>
         </p:txBody>
@@ -3911,6 +4995,36 @@
           </a:p>
         </p:txBody>
       </p:sp>
+      <p:pic>
+        <p:nvPicPr>
+          <p:cNvPr id="5" name="図 4"/>
+          <p:cNvPicPr>
+            <a:picLocks noChangeAspect="1"/>
+          </p:cNvPicPr>
+          <p:nvPr/>
+        </p:nvPicPr>
+        <p:blipFill>
+          <a:blip r:embed="rId3">
+            <a:extLst>
+              <a:ext uri="{28A0092B-C50C-407E-A947-70E740481C1C}">
+                <a14:useLocalDpi xmlns:a14="http://schemas.microsoft.com/office/drawing/2010/main" val="0"/>
+              </a:ext>
+            </a:extLst>
+          </a:blip>
+          <a:stretch>
+            <a:fillRect/>
+          </a:stretch>
+        </p:blipFill>
+        <p:spPr>
+          <a:xfrm>
+            <a:off x="6820256" y="2461869"/>
+            <a:ext cx="4099152" cy="2160000"/>
+          </a:xfrm>
+          <a:prstGeom prst="rect">
+            <a:avLst/>
+          </a:prstGeom>
+        </p:spPr>
+      </p:pic>
     </p:spTree>
     <p:extLst>
       <p:ext uri="{BB962C8B-B14F-4D97-AF65-F5344CB8AC3E}">
@@ -3957,37 +5071,59 @@
           <a:lstStyle/>
           <a:p>
             <a:r>
+              <a:rPr lang="en-US" altLang="ja-JP" dirty="0" smtClean="0"/>
+              <a:t>Tree node</a:t>
+            </a:r>
+            <a:endParaRPr kumimoji="1" lang="ja-JP" altLang="en-US" dirty="0"/>
+          </a:p>
+        </p:txBody>
+      </p:sp>
+      <p:sp>
+        <p:nvSpPr>
+          <p:cNvPr id="3" name="コンテンツ プレースホルダー 2"/>
+          <p:cNvSpPr>
+            <a:spLocks noGrp="1"/>
+          </p:cNvSpPr>
+          <p:nvPr>
+            <p:ph idx="1"/>
+          </p:nvPr>
+        </p:nvSpPr>
+        <p:spPr>
+          <a:xfrm>
+            <a:off x="838200" y="1825625"/>
+            <a:ext cx="4321629" cy="4351338"/>
+          </a:xfrm>
+        </p:spPr>
+        <p:txBody>
+          <a:bodyPr/>
+          <a:lstStyle/>
+          <a:p>
+            <a:r>
               <a:rPr kumimoji="1" lang="en-US" altLang="ja-JP" dirty="0" smtClean="0"/>
-              <a:t>Block data </a:t>
-            </a:r>
-            <a:endParaRPr kumimoji="1" lang="ja-JP" altLang="en-US" dirty="0"/>
-          </a:p>
-        </p:txBody>
-      </p:sp>
-      <p:sp>
-        <p:nvSpPr>
-          <p:cNvPr id="3" name="コンテンツ プレースホルダー 2"/>
-          <p:cNvSpPr>
-            <a:spLocks noGrp="1"/>
-          </p:cNvSpPr>
-          <p:nvPr>
-            <p:ph idx="1"/>
-          </p:nvPr>
-        </p:nvSpPr>
-        <p:spPr/>
-        <p:txBody>
-          <a:bodyPr/>
-          <a:lstStyle/>
-          <a:p>
+              <a:t>Faces x6 (or 2*</a:t>
+            </a:r>
+            <a:r>
+              <a:rPr kumimoji="1" lang="en-US" altLang="ja-JP" dirty="0" err="1" smtClean="0"/>
+              <a:t>ndim</a:t>
+            </a:r>
             <a:r>
               <a:rPr kumimoji="1" lang="en-US" altLang="ja-JP" dirty="0" smtClean="0"/>
-              <a:t>Variable location </a:t>
-            </a:r>
+              <a:t>)</a:t>
+            </a:r>
+          </a:p>
+          <a:p>
+            <a:endParaRPr lang="en-US" altLang="ja-JP" dirty="0"/>
+          </a:p>
+          <a:p>
+            <a:endParaRPr kumimoji="1" lang="en-US" altLang="ja-JP" dirty="0" smtClean="0"/>
+          </a:p>
+          <a:p>
+            <a:endParaRPr lang="en-US" altLang="ja-JP" dirty="0"/>
           </a:p>
           <a:p>
             <a:r>
               <a:rPr kumimoji="1" lang="en-US" altLang="ja-JP" dirty="0" smtClean="0"/>
-              <a:t>Index box</a:t>
+              <a:t>Children x8 (or 2^ndim)</a:t>
             </a:r>
             <a:endParaRPr kumimoji="1" lang="ja-JP" altLang="en-US" dirty="0"/>
           </a:p>
@@ -4016,10 +5152,70 @@
           </a:p>
         </p:txBody>
       </p:sp>
+      <p:pic>
+        <p:nvPicPr>
+          <p:cNvPr id="5" name="図 4"/>
+          <p:cNvPicPr>
+            <a:picLocks noChangeAspect="1"/>
+          </p:cNvPicPr>
+          <p:nvPr/>
+        </p:nvPicPr>
+        <p:blipFill>
+          <a:blip r:embed="rId2">
+            <a:extLst>
+              <a:ext uri="{28A0092B-C50C-407E-A947-70E740481C1C}">
+                <a14:useLocalDpi xmlns:a14="http://schemas.microsoft.com/office/drawing/2010/main" val="0"/>
+              </a:ext>
+            </a:extLst>
+          </a:blip>
+          <a:stretch>
+            <a:fillRect/>
+          </a:stretch>
+        </p:blipFill>
+        <p:spPr>
+          <a:xfrm>
+            <a:off x="4786665" y="589832"/>
+            <a:ext cx="3600000" cy="2806103"/>
+          </a:xfrm>
+          <a:prstGeom prst="rect">
+            <a:avLst/>
+          </a:prstGeom>
+        </p:spPr>
+      </p:pic>
+      <p:pic>
+        <p:nvPicPr>
+          <p:cNvPr id="6" name="図 5"/>
+          <p:cNvPicPr>
+            <a:picLocks noChangeAspect="1"/>
+          </p:cNvPicPr>
+          <p:nvPr/>
+        </p:nvPicPr>
+        <p:blipFill>
+          <a:blip r:embed="rId3">
+            <a:extLst>
+              <a:ext uri="{28A0092B-C50C-407E-A947-70E740481C1C}">
+                <a14:useLocalDpi xmlns:a14="http://schemas.microsoft.com/office/drawing/2010/main" val="0"/>
+              </a:ext>
+            </a:extLst>
+          </a:blip>
+          <a:stretch>
+            <a:fillRect/>
+          </a:stretch>
+        </p:blipFill>
+        <p:spPr>
+          <a:xfrm>
+            <a:off x="4856682" y="4433686"/>
+            <a:ext cx="4320000" cy="1922664"/>
+          </a:xfrm>
+          <a:prstGeom prst="rect">
+            <a:avLst/>
+          </a:prstGeom>
+        </p:spPr>
+      </p:pic>
     </p:spTree>
     <p:extLst>
       <p:ext uri="{BB962C8B-B14F-4D97-AF65-F5344CB8AC3E}">
-        <p14:creationId xmlns:p14="http://schemas.microsoft.com/office/powerpoint/2010/main" val="2834385174"/>
+        <p14:creationId xmlns:p14="http://schemas.microsoft.com/office/powerpoint/2010/main" val="4256781474"/>
       </p:ext>
     </p:extLst>
   </p:cSld>
@@ -4062,29 +5258,94 @@
           <a:lstStyle/>
           <a:p>
             <a:r>
+              <a:rPr kumimoji="1" lang="en-US" altLang="ja-JP" dirty="0" smtClean="0"/>
+              <a:t>Tree level</a:t>
+            </a:r>
+            <a:endParaRPr kumimoji="1" lang="ja-JP" altLang="en-US" dirty="0"/>
+          </a:p>
+        </p:txBody>
+      </p:sp>
+      <p:sp>
+        <p:nvSpPr>
+          <p:cNvPr id="3" name="コンテンツ プレースホルダー 2"/>
+          <p:cNvSpPr>
+            <a:spLocks noGrp="1"/>
+          </p:cNvSpPr>
+          <p:nvPr>
+            <p:ph idx="1"/>
+          </p:nvPr>
+        </p:nvSpPr>
+        <p:spPr>
+          <a:xfrm>
+            <a:off x="838200" y="1825625"/>
+            <a:ext cx="6271727" cy="4351338"/>
+          </a:xfrm>
+        </p:spPr>
+        <p:txBody>
+          <a:bodyPr/>
+          <a:lstStyle/>
+          <a:p>
+            <a:r>
+              <a:rPr kumimoji="1" lang="en-US" altLang="ja-JP" dirty="0" smtClean="0"/>
+              <a:t>Blocks with the same refinement </a:t>
+            </a:r>
+          </a:p>
+          <a:p>
+            <a:r>
               <a:rPr lang="en-US" altLang="ja-JP" dirty="0" smtClean="0"/>
-              <a:t>AMR tree</a:t>
-            </a:r>
+              <a:t>Level limits: </a:t>
+            </a:r>
+          </a:p>
+          <a:p>
+            <a:pPr lvl="1"/>
+            <a:r>
+              <a:rPr lang="en-US" altLang="ja-JP" dirty="0" smtClean="0"/>
+              <a:t>Min level: static refine up to this level</a:t>
+            </a:r>
+          </a:p>
+          <a:p>
+            <a:pPr lvl="1"/>
+            <a:r>
+              <a:rPr lang="en-US" altLang="ja-JP" dirty="0" smtClean="0"/>
+              <a:t>Max level: dynamic refine no over this level</a:t>
+            </a:r>
+          </a:p>
+          <a:p>
+            <a:pPr lvl="1"/>
+            <a:r>
+              <a:rPr lang="en-US" altLang="ja-JP" dirty="0" smtClean="0"/>
+              <a:t>Finest level: current existing level the finest</a:t>
+            </a:r>
+          </a:p>
+          <a:p>
+            <a:pPr lvl="1"/>
+            <a:r>
+              <a:rPr lang="en-US" altLang="ja-JP" dirty="0" smtClean="0"/>
+              <a:t>Possible range: [1, max level]</a:t>
+            </a:r>
+          </a:p>
+          <a:p>
+            <a:pPr lvl="2"/>
+            <a:r>
+              <a:rPr lang="en-US" altLang="ja-JP" dirty="0" smtClean="0"/>
+              <a:t>NOTE beginning from 1 is designed</a:t>
+            </a:r>
+          </a:p>
+          <a:p>
+            <a:pPr lvl="2"/>
+            <a:r>
+              <a:rPr lang="en-US" altLang="ja-JP" dirty="0" smtClean="0"/>
+              <a:t>Level 0 is left for future development</a:t>
+            </a:r>
+          </a:p>
+          <a:p>
+            <a:endParaRPr kumimoji="1" lang="en-US" altLang="ja-JP" dirty="0"/>
+          </a:p>
+          <a:p>
+            <a:endParaRPr lang="en-US" altLang="ja-JP" dirty="0" smtClean="0"/>
+          </a:p>
+          <a:p>
             <a:endParaRPr kumimoji="1" lang="ja-JP" altLang="en-US" dirty="0"/>
-          </a:p>
-        </p:txBody>
-      </p:sp>
-      <p:sp>
-        <p:nvSpPr>
-          <p:cNvPr id="3" name="コンテンツ プレースホルダー 2"/>
-          <p:cNvSpPr>
-            <a:spLocks noGrp="1"/>
-          </p:cNvSpPr>
-          <p:nvPr>
-            <p:ph idx="1"/>
-          </p:nvPr>
-        </p:nvSpPr>
-        <p:spPr/>
-        <p:txBody>
-          <a:bodyPr/>
-          <a:lstStyle/>
-          <a:p>
-            <a:endParaRPr kumimoji="1" lang="ja-JP" altLang="en-US"/>
           </a:p>
         </p:txBody>
       </p:sp>
@@ -4111,10 +5372,40 @@
           </a:p>
         </p:txBody>
       </p:sp>
+      <p:pic>
+        <p:nvPicPr>
+          <p:cNvPr id="5" name="図 4"/>
+          <p:cNvPicPr>
+            <a:picLocks noChangeAspect="1"/>
+          </p:cNvPicPr>
+          <p:nvPr/>
+        </p:nvPicPr>
+        <p:blipFill>
+          <a:blip r:embed="rId2">
+            <a:extLst>
+              <a:ext uri="{28A0092B-C50C-407E-A947-70E740481C1C}">
+                <a14:useLocalDpi xmlns:a14="http://schemas.microsoft.com/office/drawing/2010/main" val="0"/>
+              </a:ext>
+            </a:extLst>
+          </a:blip>
+          <a:stretch>
+            <a:fillRect/>
+          </a:stretch>
+        </p:blipFill>
+        <p:spPr>
+          <a:xfrm>
+            <a:off x="7109927" y="959640"/>
+            <a:ext cx="4320000" cy="1966311"/>
+          </a:xfrm>
+          <a:prstGeom prst="rect">
+            <a:avLst/>
+          </a:prstGeom>
+        </p:spPr>
+      </p:pic>
     </p:spTree>
     <p:extLst>
       <p:ext uri="{BB962C8B-B14F-4D97-AF65-F5344CB8AC3E}">
-        <p14:creationId xmlns:p14="http://schemas.microsoft.com/office/powerpoint/2010/main" val="4256781474"/>
+        <p14:creationId xmlns:p14="http://schemas.microsoft.com/office/powerpoint/2010/main" val="209328432"/>
       </p:ext>
     </p:extLst>
   </p:cSld>
@@ -4157,83 +5448,93 @@
           <a:lstStyle/>
           <a:p>
             <a:r>
+              <a:rPr kumimoji="1" lang="en-US" altLang="ja-JP" dirty="0" smtClean="0"/>
+              <a:t>Block data </a:t>
+            </a:r>
+            <a:endParaRPr kumimoji="1" lang="ja-JP" altLang="en-US" dirty="0"/>
+          </a:p>
+        </p:txBody>
+      </p:sp>
+      <p:sp>
+        <p:nvSpPr>
+          <p:cNvPr id="3" name="コンテンツ プレースホルダー 2"/>
+          <p:cNvSpPr>
+            <a:spLocks noGrp="1"/>
+          </p:cNvSpPr>
+          <p:nvPr>
+            <p:ph idx="1"/>
+          </p:nvPr>
+        </p:nvSpPr>
+        <p:spPr/>
+        <p:txBody>
+          <a:bodyPr/>
+          <a:lstStyle/>
+          <a:p>
+            <a:r>
+              <a:rPr kumimoji="1" lang="en-US" altLang="ja-JP" dirty="0" smtClean="0"/>
+              <a:t>Variable location </a:t>
+            </a:r>
+          </a:p>
+          <a:p>
+            <a:pPr lvl="1"/>
+            <a:r>
+              <a:rPr kumimoji="1" lang="en-US" altLang="ja-JP" dirty="0" smtClean="0"/>
+              <a:t>Integer encoding th</a:t>
+            </a:r>
+            <a:r>
               <a:rPr lang="en-US" altLang="ja-JP" dirty="0" smtClean="0"/>
-              <a:t>Filling valid cell</a:t>
-            </a:r>
-            <a:endParaRPr kumimoji="1" lang="ja-JP" altLang="en-US" dirty="0"/>
-          </a:p>
-        </p:txBody>
-      </p:sp>
-      <p:sp>
-        <p:nvSpPr>
-          <p:cNvPr id="3" name="コンテンツ プレースホルダー 2"/>
-          <p:cNvSpPr>
-            <a:spLocks noGrp="1"/>
-          </p:cNvSpPr>
-          <p:nvPr>
-            <p:ph idx="1"/>
-          </p:nvPr>
-        </p:nvSpPr>
-        <p:spPr/>
-        <p:txBody>
-          <a:bodyPr/>
-          <a:lstStyle/>
-          <a:p>
+              <a:t>e index type</a:t>
+            </a:r>
+          </a:p>
+          <a:p>
+            <a:pPr lvl="1"/>
+            <a:r>
+              <a:rPr lang="en-US" altLang="ja-JP" dirty="0" smtClean="0"/>
+              <a:t>Cell: &lt;0,0,0&gt;</a:t>
+            </a:r>
+          </a:p>
+          <a:p>
+            <a:pPr lvl="1"/>
             <a:r>
               <a:rPr kumimoji="1" lang="en-US" altLang="ja-JP" dirty="0" smtClean="0"/>
-              <a:t>Prolong</a:t>
+              <a:t>Face: &lt;1,0,0&gt;, &lt;0,1,0&gt;, &lt;0,0,1&gt;</a:t>
             </a:r>
           </a:p>
           <a:p>
             <a:pPr lvl="1"/>
             <a:r>
               <a:rPr lang="en-US" altLang="ja-JP" dirty="0" smtClean="0"/>
-              <a:t>Coarse -&gt; Fine</a:t>
+              <a:t>Node: &lt;1,1,1&gt;</a:t>
+            </a:r>
+            <a:endParaRPr kumimoji="1" lang="en-US" altLang="ja-JP" dirty="0" smtClean="0"/>
+          </a:p>
+          <a:p>
+            <a:r>
+              <a:rPr kumimoji="1" lang="en-US" altLang="ja-JP" dirty="0" smtClean="0"/>
+              <a:t>Index box</a:t>
             </a:r>
           </a:p>
           <a:p>
             <a:pPr lvl="1"/>
             <a:r>
               <a:rPr lang="en-US" altLang="ja-JP" dirty="0" smtClean="0"/>
-              <a:t>Injection</a:t>
+              <a:t>Two integer vectors (low &amp; high ends)</a:t>
             </a:r>
           </a:p>
           <a:p>
             <a:pPr lvl="1"/>
             <a:r>
               <a:rPr lang="en-US" altLang="ja-JP" dirty="0" smtClean="0"/>
-              <a:t>Center difference</a:t>
-            </a:r>
-          </a:p>
-          <a:p>
+              <a:t>Closed range of index</a:t>
+            </a:r>
+          </a:p>
+          <a:p>
+            <a:pPr lvl="1"/>
+            <a:r>
+              <a:rPr lang="en-US" altLang="ja-JP" dirty="0" smtClean="0"/>
+              <a:t>Allows minus index</a:t>
+            </a:r>
             <a:endParaRPr lang="en-US" altLang="ja-JP" dirty="0"/>
-          </a:p>
-          <a:p>
-            <a:r>
-              <a:rPr kumimoji="1" lang="en-US" altLang="ja-JP" dirty="0" smtClean="0"/>
-              <a:t>Restrict </a:t>
-            </a:r>
-          </a:p>
-          <a:p>
-            <a:pPr lvl="1"/>
-            <a:r>
-              <a:rPr kumimoji="1" lang="en-US" altLang="ja-JP" dirty="0" smtClean="0"/>
-              <a:t>Fine -&gt; Coarse</a:t>
-            </a:r>
-          </a:p>
-          <a:p>
-            <a:pPr lvl="1"/>
-            <a:r>
-              <a:rPr lang="en-US" altLang="ja-JP" dirty="0" smtClean="0"/>
-              <a:t>Average </a:t>
-            </a:r>
-          </a:p>
-          <a:p>
-            <a:pPr lvl="1"/>
-            <a:r>
-              <a:rPr kumimoji="1" lang="en-US" altLang="ja-JP" dirty="0" smtClean="0"/>
-              <a:t>Sum </a:t>
-            </a:r>
           </a:p>
           <a:p>
             <a:endParaRPr kumimoji="1" lang="ja-JP" altLang="en-US" dirty="0"/>
@@ -4263,10 +5564,40 @@
           </a:p>
         </p:txBody>
       </p:sp>
+      <p:pic>
+        <p:nvPicPr>
+          <p:cNvPr id="5" name="図 4"/>
+          <p:cNvPicPr>
+            <a:picLocks noChangeAspect="1"/>
+          </p:cNvPicPr>
+          <p:nvPr/>
+        </p:nvPicPr>
+        <p:blipFill>
+          <a:blip r:embed="rId2">
+            <a:extLst>
+              <a:ext uri="{28A0092B-C50C-407E-A947-70E740481C1C}">
+                <a14:useLocalDpi xmlns:a14="http://schemas.microsoft.com/office/drawing/2010/main" val="0"/>
+              </a:ext>
+            </a:extLst>
+          </a:blip>
+          <a:stretch>
+            <a:fillRect/>
+          </a:stretch>
+        </p:blipFill>
+        <p:spPr>
+          <a:xfrm>
+            <a:off x="7190274" y="1825625"/>
+            <a:ext cx="3600000" cy="3600000"/>
+          </a:xfrm>
+          <a:prstGeom prst="rect">
+            <a:avLst/>
+          </a:prstGeom>
+        </p:spPr>
+      </p:pic>
     </p:spTree>
     <p:extLst>
       <p:ext uri="{BB962C8B-B14F-4D97-AF65-F5344CB8AC3E}">
-        <p14:creationId xmlns:p14="http://schemas.microsoft.com/office/powerpoint/2010/main" val="1632279324"/>
+        <p14:creationId xmlns:p14="http://schemas.microsoft.com/office/powerpoint/2010/main" val="2834385174"/>
       </p:ext>
     </p:extLst>
   </p:cSld>
@@ -4310,7 +5641,7 @@
           <a:p>
             <a:r>
               <a:rPr kumimoji="1" lang="en-US" altLang="ja-JP" dirty="0" smtClean="0"/>
-              <a:t>Filling ghost cell</a:t>
+              <a:t>Block data </a:t>
             </a:r>
             <a:endParaRPr kumimoji="1" lang="ja-JP" altLang="en-US" dirty="0"/>
           </a:p>
@@ -4326,50 +5657,94 @@
             <p:ph idx="1"/>
           </p:nvPr>
         </p:nvSpPr>
-        <p:spPr/>
+        <p:spPr>
+          <a:xfrm>
+            <a:off x="838200" y="1825625"/>
+            <a:ext cx="5021424" cy="4351338"/>
+          </a:xfrm>
+        </p:spPr>
         <p:txBody>
           <a:bodyPr/>
           <a:lstStyle/>
           <a:p>
             <a:r>
               <a:rPr kumimoji="1" lang="en-US" altLang="ja-JP" dirty="0" smtClean="0"/>
-              <a:t>Intra-level operations</a:t>
+              <a:t>Data buffer</a:t>
             </a:r>
           </a:p>
           <a:p>
             <a:pPr lvl="1"/>
             <a:r>
               <a:rPr kumimoji="1" lang="en-US" altLang="ja-JP" dirty="0" smtClean="0"/>
-              <a:t>Fill block boundary on same level</a:t>
+              <a:t>Valid part: true data </a:t>
             </a:r>
           </a:p>
           <a:p>
             <a:pPr lvl="1"/>
             <a:r>
               <a:rPr lang="en-US" altLang="ja-JP" dirty="0" smtClean="0"/>
-              <a:t>Fill physical boundary </a:t>
-            </a:r>
+              <a:t>Ghost part </a:t>
+            </a:r>
+          </a:p>
+          <a:p>
+            <a:pPr lvl="2"/>
+            <a:r>
+              <a:rPr kumimoji="1" lang="en-US" altLang="ja-JP" dirty="0" smtClean="0"/>
+              <a:t>Data from neighbor block </a:t>
+            </a:r>
+          </a:p>
+          <a:p>
+            <a:pPr lvl="2"/>
+            <a:r>
+              <a:rPr lang="en-US" altLang="ja-JP" dirty="0" smtClean="0"/>
+              <a:t>Data from coarser level</a:t>
+            </a:r>
+          </a:p>
+          <a:p>
+            <a:pPr lvl="2"/>
+            <a:r>
+              <a:rPr kumimoji="1" lang="en-US" altLang="ja-JP" dirty="0" smtClean="0"/>
+              <a:t>Data from physical boundary</a:t>
+            </a:r>
+          </a:p>
+          <a:p>
+            <a:pPr lvl="1"/>
+            <a:r>
+              <a:rPr lang="en-US" altLang="ja-JP" dirty="0" smtClean="0"/>
+              <a:t>Access by data(</a:t>
+            </a:r>
+            <a:r>
+              <a:rPr lang="en-US" altLang="ja-JP" dirty="0" err="1" smtClean="0"/>
+              <a:t>I,J,K,component</a:t>
+            </a:r>
+            <a:r>
+              <a:rPr lang="en-US" altLang="ja-JP" dirty="0" smtClean="0"/>
+              <a:t>)</a:t>
+            </a:r>
+            <a:endParaRPr kumimoji="1" lang="en-US" altLang="ja-JP" dirty="0" smtClean="0"/>
           </a:p>
           <a:p>
             <a:pPr lvl="1"/>
             <a:endParaRPr kumimoji="1" lang="en-US" altLang="ja-JP" dirty="0" smtClean="0"/>
           </a:p>
           <a:p>
+            <a:pPr lvl="1"/>
+            <a:r>
+              <a:rPr kumimoji="1" lang="en-US" altLang="ja-JP" dirty="0" smtClean="0"/>
+              <a:t>Staggered data may have overlap between two adja</a:t>
+            </a:r>
+            <a:r>
+              <a:rPr lang="en-US" altLang="ja-JP" dirty="0" smtClean="0"/>
+              <a:t>cent blocks</a:t>
+            </a:r>
+            <a:br>
+              <a:rPr lang="en-US" altLang="ja-JP" dirty="0" smtClean="0"/>
+            </a:br>
+            <a:r>
+              <a:rPr lang="en-US" altLang="ja-JP" dirty="0" smtClean="0"/>
+              <a:t>-&gt; need proper treatment</a:t>
+            </a:r>
             <a:endParaRPr kumimoji="1" lang="en-US" altLang="ja-JP" dirty="0" smtClean="0"/>
-          </a:p>
-          <a:p>
-            <a:r>
-              <a:rPr lang="en-US" altLang="ja-JP" dirty="0" smtClean="0"/>
-              <a:t>Inter-level operations </a:t>
-            </a:r>
-            <a:endParaRPr lang="en-US" altLang="ja-JP" dirty="0"/>
-          </a:p>
-          <a:p>
-            <a:pPr lvl="1"/>
-            <a:r>
-              <a:rPr kumimoji="1" lang="en-US" altLang="ja-JP" dirty="0" smtClean="0"/>
-              <a:t>Fill coarse-fine boundary </a:t>
-            </a:r>
           </a:p>
           <a:p>
             <a:endParaRPr kumimoji="1" lang="ja-JP" altLang="en-US" dirty="0"/>
@@ -4399,10 +5774,40 @@
           </a:p>
         </p:txBody>
       </p:sp>
+      <p:pic>
+        <p:nvPicPr>
+          <p:cNvPr id="5" name="図 4"/>
+          <p:cNvPicPr>
+            <a:picLocks noChangeAspect="1"/>
+          </p:cNvPicPr>
+          <p:nvPr/>
+        </p:nvPicPr>
+        <p:blipFill>
+          <a:blip r:embed="rId2">
+            <a:extLst>
+              <a:ext uri="{28A0092B-C50C-407E-A947-70E740481C1C}">
+                <a14:useLocalDpi xmlns:a14="http://schemas.microsoft.com/office/drawing/2010/main" val="0"/>
+              </a:ext>
+            </a:extLst>
+          </a:blip>
+          <a:stretch>
+            <a:fillRect/>
+          </a:stretch>
+        </p:blipFill>
+        <p:spPr>
+          <a:xfrm>
+            <a:off x="7239808" y="1534270"/>
+            <a:ext cx="3600000" cy="3600000"/>
+          </a:xfrm>
+          <a:prstGeom prst="rect">
+            <a:avLst/>
+          </a:prstGeom>
+        </p:spPr>
+      </p:pic>
     </p:spTree>
     <p:extLst>
       <p:ext uri="{BB962C8B-B14F-4D97-AF65-F5344CB8AC3E}">
-        <p14:creationId xmlns:p14="http://schemas.microsoft.com/office/powerpoint/2010/main" val="2481472036"/>
+        <p14:creationId xmlns:p14="http://schemas.microsoft.com/office/powerpoint/2010/main" val="1479685200"/>
       </p:ext>
     </p:extLst>
   </p:cSld>
@@ -4446,7 +5851,7 @@
           <a:p>
             <a:r>
               <a:rPr kumimoji="1" lang="en-US" altLang="ja-JP" dirty="0" smtClean="0"/>
-              <a:t>Concept of ‘Tower’</a:t>
+              <a:t>Build a tree: root level</a:t>
             </a:r>
             <a:endParaRPr kumimoji="1" lang="ja-JP" altLang="en-US" dirty="0"/>
           </a:p>
@@ -4467,11 +5872,7 @@
           <a:bodyPr/>
           <a:lstStyle/>
           <a:p>
-            <a:r>
-              <a:rPr kumimoji="1" lang="en-US" altLang="ja-JP" dirty="0" smtClean="0"/>
-              <a:t>Set of uncovered blocks </a:t>
-            </a:r>
-            <a:endParaRPr kumimoji="1" lang="ja-JP" altLang="en-US" dirty="0"/>
+            <a:endParaRPr kumimoji="1" lang="ja-JP" altLang="en-US"/>
           </a:p>
         </p:txBody>
       </p:sp>
@@ -4501,7 +5902,7 @@
     </p:spTree>
     <p:extLst>
       <p:ext uri="{BB962C8B-B14F-4D97-AF65-F5344CB8AC3E}">
-        <p14:creationId xmlns:p14="http://schemas.microsoft.com/office/powerpoint/2010/main" val="42682091"/>
+        <p14:creationId xmlns:p14="http://schemas.microsoft.com/office/powerpoint/2010/main" val="3617914140"/>
       </p:ext>
     </p:extLst>
   </p:cSld>
@@ -4545,7 +5946,7 @@
           <a:p>
             <a:r>
               <a:rPr kumimoji="1" lang="en-US" altLang="ja-JP" dirty="0" smtClean="0"/>
-              <a:t>MAC solver</a:t>
+              <a:t>Build a tree: </a:t>
             </a:r>
             <a:endParaRPr kumimoji="1" lang="ja-JP" altLang="en-US" dirty="0"/>
           </a:p>
@@ -4566,62 +5967,7 @@
           <a:bodyPr/>
           <a:lstStyle/>
           <a:p>
-            <a:r>
-              <a:rPr kumimoji="1" lang="en-US" altLang="ja-JP" dirty="0" smtClean="0"/>
-              <a:t>Extensively use Tower</a:t>
-            </a:r>
-          </a:p>
-          <a:p>
-            <a:r>
-              <a:rPr lang="en-US" altLang="ja-JP" dirty="0" smtClean="0"/>
-              <a:t>Only first-order at coarse/fine face </a:t>
-            </a:r>
-          </a:p>
-          <a:p>
-            <a:r>
-              <a:rPr lang="en-US" altLang="ja-JP" dirty="0" smtClean="0"/>
-              <a:t>Can help compute flux of solution</a:t>
-            </a:r>
-          </a:p>
-          <a:p>
-            <a:endParaRPr lang="en-US" altLang="ja-JP" dirty="0"/>
-          </a:p>
-          <a:p>
-            <a:r>
-              <a:rPr kumimoji="1" lang="en-US" altLang="ja-JP" dirty="0" smtClean="0"/>
-              <a:t>MG precondition</a:t>
-            </a:r>
-          </a:p>
-          <a:p>
-            <a:pPr lvl="1"/>
-            <a:r>
-              <a:rPr lang="en-US" altLang="ja-JP" dirty="0" smtClean="0"/>
-              <a:t>Levels of towers as </a:t>
-            </a:r>
-            <a:r>
-              <a:rPr lang="en-US" altLang="ja-JP" dirty="0" err="1" smtClean="0"/>
-              <a:t>multigrids</a:t>
-            </a:r>
-            <a:r>
-              <a:rPr lang="en-US" altLang="ja-JP" dirty="0" smtClean="0"/>
-              <a:t> </a:t>
-            </a:r>
-          </a:p>
-          <a:p>
-            <a:pPr lvl="1"/>
-            <a:r>
-              <a:rPr lang="en-US" altLang="ja-JP" dirty="0" smtClean="0"/>
-              <a:t>GS as smoother, bottom use CG</a:t>
-            </a:r>
-          </a:p>
-          <a:p>
-            <a:r>
-              <a:rPr kumimoji="1" lang="en-US" altLang="ja-JP" dirty="0" smtClean="0"/>
-              <a:t>CG solver</a:t>
-            </a:r>
-          </a:p>
-          <a:p>
-            <a:endParaRPr kumimoji="1" lang="ja-JP" altLang="en-US" dirty="0"/>
+            <a:endParaRPr kumimoji="1" lang="ja-JP" altLang="en-US"/>
           </a:p>
         </p:txBody>
       </p:sp>
@@ -4651,7 +5997,159 @@
     </p:spTree>
     <p:extLst>
       <p:ext uri="{BB962C8B-B14F-4D97-AF65-F5344CB8AC3E}">
-        <p14:creationId xmlns:p14="http://schemas.microsoft.com/office/powerpoint/2010/main" val="994964334"/>
+        <p14:creationId xmlns:p14="http://schemas.microsoft.com/office/powerpoint/2010/main" val="2777996525"/>
+      </p:ext>
+    </p:extLst>
+  </p:cSld>
+  <p:clrMapOvr>
+    <a:masterClrMapping/>
+  </p:clrMapOvr>
+</p:sld>
+</file>
+
+<file path=ppt/slides/slide9.xml><?xml version="1.0" encoding="utf-8"?>
+<p:sld xmlns:a="http://schemas.openxmlformats.org/drawingml/2006/main" xmlns:r="http://schemas.openxmlformats.org/officeDocument/2006/relationships" xmlns:p="http://schemas.openxmlformats.org/presentationml/2006/main">
+  <p:cSld>
+    <p:spTree>
+      <p:nvGrpSpPr>
+        <p:cNvPr id="1" name=""/>
+        <p:cNvGrpSpPr/>
+        <p:nvPr/>
+      </p:nvGrpSpPr>
+      <p:grpSpPr>
+        <a:xfrm>
+          <a:off x="0" y="0"/>
+          <a:ext cx="0" cy="0"/>
+          <a:chOff x="0" y="0"/>
+          <a:chExt cx="0" cy="0"/>
+        </a:xfrm>
+      </p:grpSpPr>
+      <p:sp>
+        <p:nvSpPr>
+          <p:cNvPr id="2" name="タイトル 1"/>
+          <p:cNvSpPr>
+            <a:spLocks noGrp="1"/>
+          </p:cNvSpPr>
+          <p:nvPr>
+            <p:ph type="title"/>
+          </p:nvPr>
+        </p:nvSpPr>
+        <p:spPr/>
+        <p:txBody>
+          <a:bodyPr/>
+          <a:lstStyle/>
+          <a:p>
+            <a:r>
+              <a:rPr lang="en-US" altLang="ja-JP" dirty="0" smtClean="0"/>
+              <a:t>Filling valid cell</a:t>
+            </a:r>
+            <a:endParaRPr kumimoji="1" lang="ja-JP" altLang="en-US" dirty="0"/>
+          </a:p>
+        </p:txBody>
+      </p:sp>
+      <p:sp>
+        <p:nvSpPr>
+          <p:cNvPr id="3" name="コンテンツ プレースホルダー 2"/>
+          <p:cNvSpPr>
+            <a:spLocks noGrp="1"/>
+          </p:cNvSpPr>
+          <p:nvPr>
+            <p:ph idx="1"/>
+          </p:nvPr>
+        </p:nvSpPr>
+        <p:spPr/>
+        <p:txBody>
+          <a:bodyPr/>
+          <a:lstStyle/>
+          <a:p>
+            <a:r>
+              <a:rPr kumimoji="1" lang="en-US" altLang="ja-JP" dirty="0" smtClean="0"/>
+              <a:t>Prolong</a:t>
+            </a:r>
+          </a:p>
+          <a:p>
+            <a:pPr lvl="1"/>
+            <a:r>
+              <a:rPr lang="en-US" altLang="ja-JP" dirty="0" smtClean="0"/>
+              <a:t>Coarse -&gt; Fine</a:t>
+            </a:r>
+          </a:p>
+          <a:p>
+            <a:pPr lvl="1"/>
+            <a:r>
+              <a:rPr lang="en-US" altLang="ja-JP" dirty="0" smtClean="0"/>
+              <a:t>Injection</a:t>
+            </a:r>
+          </a:p>
+          <a:p>
+            <a:pPr lvl="1"/>
+            <a:r>
+              <a:rPr lang="en-US" altLang="ja-JP" dirty="0" smtClean="0"/>
+              <a:t>Center difference</a:t>
+            </a:r>
+          </a:p>
+          <a:p>
+            <a:endParaRPr lang="en-US" altLang="ja-JP" dirty="0"/>
+          </a:p>
+          <a:p>
+            <a:r>
+              <a:rPr kumimoji="1" lang="en-US" altLang="ja-JP" dirty="0" smtClean="0"/>
+              <a:t>Restrict </a:t>
+            </a:r>
+          </a:p>
+          <a:p>
+            <a:pPr lvl="1"/>
+            <a:r>
+              <a:rPr kumimoji="1" lang="en-US" altLang="ja-JP" dirty="0" smtClean="0"/>
+              <a:t>Fine -&gt; Coarse</a:t>
+            </a:r>
+          </a:p>
+          <a:p>
+            <a:pPr lvl="1"/>
+            <a:r>
+              <a:rPr lang="en-US" altLang="ja-JP" dirty="0" smtClean="0"/>
+              <a:t>Average </a:t>
+            </a:r>
+          </a:p>
+          <a:p>
+            <a:pPr lvl="1"/>
+            <a:r>
+              <a:rPr kumimoji="1" lang="en-US" altLang="ja-JP" dirty="0" smtClean="0"/>
+              <a:t>Sum </a:t>
+            </a:r>
+          </a:p>
+          <a:p>
+            <a:endParaRPr kumimoji="1" lang="ja-JP" altLang="en-US" dirty="0"/>
+          </a:p>
+        </p:txBody>
+      </p:sp>
+      <p:sp>
+        <p:nvSpPr>
+          <p:cNvPr id="4" name="スライド番号プレースホルダー 3"/>
+          <p:cNvSpPr>
+            <a:spLocks noGrp="1"/>
+          </p:cNvSpPr>
+          <p:nvPr>
+            <p:ph type="sldNum" sz="quarter" idx="12"/>
+          </p:nvPr>
+        </p:nvSpPr>
+        <p:spPr/>
+        <p:txBody>
+          <a:bodyPr/>
+          <a:lstStyle/>
+          <a:p>
+            <a:fld id="{83394D8B-D218-4906-9338-12464234E02D}" type="slidenum">
+              <a:rPr kumimoji="1" lang="ja-JP" altLang="en-US" smtClean="0"/>
+              <a:t>9</a:t>
+            </a:fld>
+            <a:endParaRPr kumimoji="1" lang="ja-JP" altLang="en-US"/>
+          </a:p>
+        </p:txBody>
+      </p:sp>
+    </p:spTree>
+    <p:extLst>
+      <p:ext uri="{BB962C8B-B14F-4D97-AF65-F5344CB8AC3E}">
+        <p14:creationId xmlns:p14="http://schemas.microsoft.com/office/powerpoint/2010/main" val="1632279324"/>
       </p:ext>
     </p:extLst>
   </p:cSld>
@@ -5181,4 +6679,265 @@
     </a:ext>
   </a:extLst>
 </a:theme>
+</file>
+
+<file path=ppt/theme/theme3.xml><?xml version="1.0" encoding="utf-8"?>
+<a:theme xmlns:a="http://schemas.openxmlformats.org/drawingml/2006/main" name="Office テーマ">
+  <a:themeElements>
+    <a:clrScheme name="Office">
+      <a:dk1>
+        <a:sysClr val="windowText" lastClr="000000"/>
+      </a:dk1>
+      <a:lt1>
+        <a:sysClr val="window" lastClr="FFFFFF"/>
+      </a:lt1>
+      <a:dk2>
+        <a:srgbClr val="44546A"/>
+      </a:dk2>
+      <a:lt2>
+        <a:srgbClr val="E7E6E6"/>
+      </a:lt2>
+      <a:accent1>
+        <a:srgbClr val="5B9BD5"/>
+      </a:accent1>
+      <a:accent2>
+        <a:srgbClr val="ED7D31"/>
+      </a:accent2>
+      <a:accent3>
+        <a:srgbClr val="A5A5A5"/>
+      </a:accent3>
+      <a:accent4>
+        <a:srgbClr val="FFC000"/>
+      </a:accent4>
+      <a:accent5>
+        <a:srgbClr val="4472C4"/>
+      </a:accent5>
+      <a:accent6>
+        <a:srgbClr val="70AD47"/>
+      </a:accent6>
+      <a:hlink>
+        <a:srgbClr val="0563C1"/>
+      </a:hlink>
+      <a:folHlink>
+        <a:srgbClr val="954F72"/>
+      </a:folHlink>
+    </a:clrScheme>
+    <a:fontScheme name="Office">
+      <a:majorFont>
+        <a:latin typeface="Calibri Light" panose="020F0302020204030204"/>
+        <a:ea typeface=""/>
+        <a:cs typeface=""/>
+        <a:font script="Jpan" typeface="ＭＳ Ｐゴシック"/>
+        <a:font script="Hang" typeface="맑은 고딕"/>
+        <a:font script="Hans" typeface="宋体"/>
+        <a:font script="Hant" typeface="新細明體"/>
+        <a:font script="Arab" typeface="Times New Roman"/>
+        <a:font script="Hebr" typeface="Times New Roman"/>
+        <a:font script="Thai" typeface="Angsana New"/>
+        <a:font script="Ethi" typeface="Nyala"/>
+        <a:font script="Beng" typeface="Vrinda"/>
+        <a:font script="Gujr" typeface="Shruti"/>
+        <a:font script="Khmr" typeface="MoolBoran"/>
+        <a:font script="Knda" typeface="Tunga"/>
+        <a:font script="Guru" typeface="Raavi"/>
+        <a:font script="Cans" typeface="Euphemia"/>
+        <a:font script="Cher" typeface="Plantagenet Cherokee"/>
+        <a:font script="Yiii" typeface="Microsoft Yi Baiti"/>
+        <a:font script="Tibt" typeface="Microsoft Himalaya"/>
+        <a:font script="Thaa" typeface="MV Boli"/>
+        <a:font script="Deva" typeface="Mangal"/>
+        <a:font script="Telu" typeface="Gautami"/>
+        <a:font script="Taml" typeface="Latha"/>
+        <a:font script="Syrc" typeface="Estrangelo Edessa"/>
+        <a:font script="Orya" typeface="Kalinga"/>
+        <a:font script="Mlym" typeface="Kartika"/>
+        <a:font script="Laoo" typeface="DokChampa"/>
+        <a:font script="Sinh" typeface="Iskoola Pota"/>
+        <a:font script="Mong" typeface="Mongolian Baiti"/>
+        <a:font script="Viet" typeface="Times New Roman"/>
+        <a:font script="Uigh" typeface="Microsoft Uighur"/>
+        <a:font script="Geor" typeface="Sylfaen"/>
+      </a:majorFont>
+      <a:minorFont>
+        <a:latin typeface="Calibri" panose="020F0502020204030204"/>
+        <a:ea typeface=""/>
+        <a:cs typeface=""/>
+        <a:font script="Jpan" typeface="ＭＳ Ｐゴシック"/>
+        <a:font script="Hang" typeface="맑은 고딕"/>
+        <a:font script="Hans" typeface="宋体"/>
+        <a:font script="Hant" typeface="新細明體"/>
+        <a:font script="Arab" typeface="Arial"/>
+        <a:font script="Hebr" typeface="Arial"/>
+        <a:font script="Thai" typeface="Cordia New"/>
+        <a:font script="Ethi" typeface="Nyala"/>
+        <a:font script="Beng" typeface="Vrinda"/>
+        <a:font script="Gujr" typeface="Shruti"/>
+        <a:font script="Khmr" typeface="DaunPenh"/>
+        <a:font script="Knda" typeface="Tunga"/>
+        <a:font script="Guru" typeface="Raavi"/>
+        <a:font script="Cans" typeface="Euphemia"/>
+        <a:font script="Cher" typeface="Plantagenet Cherokee"/>
+        <a:font script="Yiii" typeface="Microsoft Yi Baiti"/>
+        <a:font script="Tibt" typeface="Microsoft Himalaya"/>
+        <a:font script="Thaa" typeface="MV Boli"/>
+        <a:font script="Deva" typeface="Mangal"/>
+        <a:font script="Telu" typeface="Gautami"/>
+        <a:font script="Taml" typeface="Latha"/>
+        <a:font script="Syrc" typeface="Estrangelo Edessa"/>
+        <a:font script="Orya" typeface="Kalinga"/>
+        <a:font script="Mlym" typeface="Kartika"/>
+        <a:font script="Laoo" typeface="DokChampa"/>
+        <a:font script="Sinh" typeface="Iskoola Pota"/>
+        <a:font script="Mong" typeface="Mongolian Baiti"/>
+        <a:font script="Viet" typeface="Arial"/>
+        <a:font script="Uigh" typeface="Microsoft Uighur"/>
+        <a:font script="Geor" typeface="Sylfaen"/>
+      </a:minorFont>
+    </a:fontScheme>
+    <a:fmtScheme name="Office">
+      <a:fillStyleLst>
+        <a:solidFill>
+          <a:schemeClr val="phClr"/>
+        </a:solidFill>
+        <a:gradFill rotWithShape="1">
+          <a:gsLst>
+            <a:gs pos="0">
+              <a:schemeClr val="phClr">
+                <a:lumMod val="110000"/>
+                <a:satMod val="105000"/>
+                <a:tint val="67000"/>
+              </a:schemeClr>
+            </a:gs>
+            <a:gs pos="50000">
+              <a:schemeClr val="phClr">
+                <a:lumMod val="105000"/>
+                <a:satMod val="103000"/>
+                <a:tint val="73000"/>
+              </a:schemeClr>
+            </a:gs>
+            <a:gs pos="100000">
+              <a:schemeClr val="phClr">
+                <a:lumMod val="105000"/>
+                <a:satMod val="109000"/>
+                <a:tint val="81000"/>
+              </a:schemeClr>
+            </a:gs>
+          </a:gsLst>
+          <a:lin ang="5400000" scaled="0"/>
+        </a:gradFill>
+        <a:gradFill rotWithShape="1">
+          <a:gsLst>
+            <a:gs pos="0">
+              <a:schemeClr val="phClr">
+                <a:satMod val="103000"/>
+                <a:lumMod val="102000"/>
+                <a:tint val="94000"/>
+              </a:schemeClr>
+            </a:gs>
+            <a:gs pos="50000">
+              <a:schemeClr val="phClr">
+                <a:satMod val="110000"/>
+                <a:lumMod val="100000"/>
+                <a:shade val="100000"/>
+              </a:schemeClr>
+            </a:gs>
+            <a:gs pos="100000">
+              <a:schemeClr val="phClr">
+                <a:lumMod val="99000"/>
+                <a:satMod val="120000"/>
+                <a:shade val="78000"/>
+              </a:schemeClr>
+            </a:gs>
+          </a:gsLst>
+          <a:lin ang="5400000" scaled="0"/>
+        </a:gradFill>
+      </a:fillStyleLst>
+      <a:lnStyleLst>
+        <a:ln w="6350" cap="flat" cmpd="sng" algn="ctr">
+          <a:solidFill>
+            <a:schemeClr val="phClr"/>
+          </a:solidFill>
+          <a:prstDash val="solid"/>
+          <a:miter lim="800000"/>
+        </a:ln>
+        <a:ln w="12700" cap="flat" cmpd="sng" algn="ctr">
+          <a:solidFill>
+            <a:schemeClr val="phClr"/>
+          </a:solidFill>
+          <a:prstDash val="solid"/>
+          <a:miter lim="800000"/>
+        </a:ln>
+        <a:ln w="19050" cap="flat" cmpd="sng" algn="ctr">
+          <a:solidFill>
+            <a:schemeClr val="phClr"/>
+          </a:solidFill>
+          <a:prstDash val="solid"/>
+          <a:miter lim="800000"/>
+        </a:ln>
+      </a:lnStyleLst>
+      <a:effectStyleLst>
+        <a:effectStyle>
+          <a:effectLst/>
+        </a:effectStyle>
+        <a:effectStyle>
+          <a:effectLst/>
+        </a:effectStyle>
+        <a:effectStyle>
+          <a:effectLst>
+            <a:outerShdw blurRad="57150" dist="19050" dir="5400000" algn="ctr" rotWithShape="0">
+              <a:srgbClr val="000000">
+                <a:alpha val="63000"/>
+              </a:srgbClr>
+            </a:outerShdw>
+          </a:effectLst>
+        </a:effectStyle>
+      </a:effectStyleLst>
+      <a:bgFillStyleLst>
+        <a:solidFill>
+          <a:schemeClr val="phClr"/>
+        </a:solidFill>
+        <a:solidFill>
+          <a:schemeClr val="phClr">
+            <a:tint val="95000"/>
+            <a:satMod val="170000"/>
+          </a:schemeClr>
+        </a:solidFill>
+        <a:gradFill rotWithShape="1">
+          <a:gsLst>
+            <a:gs pos="0">
+              <a:schemeClr val="phClr">
+                <a:tint val="93000"/>
+                <a:satMod val="150000"/>
+                <a:shade val="98000"/>
+                <a:lumMod val="102000"/>
+              </a:schemeClr>
+            </a:gs>
+            <a:gs pos="50000">
+              <a:schemeClr val="phClr">
+                <a:tint val="98000"/>
+                <a:satMod val="130000"/>
+                <a:shade val="90000"/>
+                <a:lumMod val="103000"/>
+              </a:schemeClr>
+            </a:gs>
+            <a:gs pos="100000">
+              <a:schemeClr val="phClr">
+                <a:shade val="63000"/>
+                <a:satMod val="120000"/>
+              </a:schemeClr>
+            </a:gs>
+          </a:gsLst>
+          <a:lin ang="5400000" scaled="0"/>
+        </a:gradFill>
+      </a:bgFillStyleLst>
+    </a:fmtScheme>
+  </a:themeElements>
+  <a:objectDefaults/>
+  <a:extraClrSchemeLst/>
+  <a:extLst>
+    <a:ext uri="{05A4C25C-085E-4340-85A3-A5531E510DB2}">
+      <thm15:themeFamily xmlns:thm15="http://schemas.microsoft.com/office/thememl/2012/main" name="Office Theme" id="{62F939B6-93AF-4DB8-9C6B-D6C7DFDC589F}" vid="{4A3C46E8-61CC-4603-A589-7422A47A8E4A}"/>
+    </a:ext>
+  </a:extLst>
+</a:theme>
 </file>
</xml_diff>